<commit_message>
added half of one foldout
</commit_message>
<xml_diff>
--- a/foldouts.pptx
+++ b/foldouts.pptx
@@ -6,6 +6,7 @@
   </p:sldMasterIdLst>
   <p:sldIdLst>
     <p:sldId id="256" r:id="rId2"/>
+    <p:sldId id="257" r:id="rId3"/>
   </p:sldIdLst>
   <p:sldSz cx="15544800" cy="10058400"/>
   <p:notesSz cx="6858000" cy="9144000"/>
@@ -104,6 +105,11 @@
       </a:defRPr>
     </a:lvl9pPr>
   </p:defaultTextStyle>
+  <p:extLst>
+    <p:ext uri="{EFAFB233-063F-42B5-8137-9DF3F51BA10A}">
+      <p15:sldGuideLst xmlns:p15="http://schemas.microsoft.com/office/powerpoint/2012/main"/>
+    </p:ext>
+  </p:extLst>
 </p:presentation>
 </file>
 
@@ -238,7 +244,7 @@
           <a:p>
             <a:fld id="{E974B250-0C3F-40FE-9593-256ACF326FB3}" type="datetimeFigureOut">
               <a:rPr lang="en-US" smtClean="0"/>
-              <a:t>4/14/2022</a:t>
+              <a:t>4/19/2022</a:t>
             </a:fld>
             <a:endParaRPr lang="en-US"/>
           </a:p>
@@ -408,7 +414,7 @@
           <a:p>
             <a:fld id="{E974B250-0C3F-40FE-9593-256ACF326FB3}" type="datetimeFigureOut">
               <a:rPr lang="en-US" smtClean="0"/>
-              <a:t>4/14/2022</a:t>
+              <a:t>4/19/2022</a:t>
             </a:fld>
             <a:endParaRPr lang="en-US"/>
           </a:p>
@@ -588,7 +594,7 @@
           <a:p>
             <a:fld id="{E974B250-0C3F-40FE-9593-256ACF326FB3}" type="datetimeFigureOut">
               <a:rPr lang="en-US" smtClean="0"/>
-              <a:t>4/14/2022</a:t>
+              <a:t>4/19/2022</a:t>
             </a:fld>
             <a:endParaRPr lang="en-US"/>
           </a:p>
@@ -758,7 +764,7 @@
           <a:p>
             <a:fld id="{E974B250-0C3F-40FE-9593-256ACF326FB3}" type="datetimeFigureOut">
               <a:rPr lang="en-US" smtClean="0"/>
-              <a:t>4/14/2022</a:t>
+              <a:t>4/19/2022</a:t>
             </a:fld>
             <a:endParaRPr lang="en-US"/>
           </a:p>
@@ -1002,7 +1008,7 @@
           <a:p>
             <a:fld id="{E974B250-0C3F-40FE-9593-256ACF326FB3}" type="datetimeFigureOut">
               <a:rPr lang="en-US" smtClean="0"/>
-              <a:t>4/14/2022</a:t>
+              <a:t>4/19/2022</a:t>
             </a:fld>
             <a:endParaRPr lang="en-US"/>
           </a:p>
@@ -1234,7 +1240,7 @@
           <a:p>
             <a:fld id="{E974B250-0C3F-40FE-9593-256ACF326FB3}" type="datetimeFigureOut">
               <a:rPr lang="en-US" smtClean="0"/>
-              <a:t>4/14/2022</a:t>
+              <a:t>4/19/2022</a:t>
             </a:fld>
             <a:endParaRPr lang="en-US"/>
           </a:p>
@@ -1601,7 +1607,7 @@
           <a:p>
             <a:fld id="{E974B250-0C3F-40FE-9593-256ACF326FB3}" type="datetimeFigureOut">
               <a:rPr lang="en-US" smtClean="0"/>
-              <a:t>4/14/2022</a:t>
+              <a:t>4/19/2022</a:t>
             </a:fld>
             <a:endParaRPr lang="en-US"/>
           </a:p>
@@ -1719,7 +1725,7 @@
           <a:p>
             <a:fld id="{E974B250-0C3F-40FE-9593-256ACF326FB3}" type="datetimeFigureOut">
               <a:rPr lang="en-US" smtClean="0"/>
-              <a:t>4/14/2022</a:t>
+              <a:t>4/19/2022</a:t>
             </a:fld>
             <a:endParaRPr lang="en-US"/>
           </a:p>
@@ -1814,7 +1820,7 @@
           <a:p>
             <a:fld id="{E974B250-0C3F-40FE-9593-256ACF326FB3}" type="datetimeFigureOut">
               <a:rPr lang="en-US" smtClean="0"/>
-              <a:t>4/14/2022</a:t>
+              <a:t>4/19/2022</a:t>
             </a:fld>
             <a:endParaRPr lang="en-US"/>
           </a:p>
@@ -2091,7 +2097,7 @@
           <a:p>
             <a:fld id="{E974B250-0C3F-40FE-9593-256ACF326FB3}" type="datetimeFigureOut">
               <a:rPr lang="en-US" smtClean="0"/>
-              <a:t>4/14/2022</a:t>
+              <a:t>4/19/2022</a:t>
             </a:fld>
             <a:endParaRPr lang="en-US"/>
           </a:p>
@@ -2348,7 +2354,7 @@
           <a:p>
             <a:fld id="{E974B250-0C3F-40FE-9593-256ACF326FB3}" type="datetimeFigureOut">
               <a:rPr lang="en-US" smtClean="0"/>
-              <a:t>4/14/2022</a:t>
+              <a:t>4/19/2022</a:t>
             </a:fld>
             <a:endParaRPr lang="en-US"/>
           </a:p>
@@ -2561,7 +2567,7 @@
           <a:p>
             <a:fld id="{E974B250-0C3F-40FE-9593-256ACF326FB3}" type="datetimeFigureOut">
               <a:rPr lang="en-US" smtClean="0"/>
-              <a:t>4/14/2022</a:t>
+              <a:t>4/19/2022</a:t>
             </a:fld>
             <a:endParaRPr lang="en-US"/>
           </a:p>
@@ -3357,7 +3363,7 @@
                   </a:schemeClr>
                 </a:solidFill>
               </a:rPr>
-              <a:t>Delta-V: 0.9 km/s</a:t>
+              <a:t>Delta-V: 0.90 km/s</a:t>
             </a:r>
           </a:p>
           <a:p>
@@ -3874,6 +3880,1649 @@
     <p:extLst>
       <p:ext uri="{BB962C8B-B14F-4D97-AF65-F5344CB8AC3E}">
         <p14:creationId xmlns:p14="http://schemas.microsoft.com/office/powerpoint/2010/main" val="1401646454"/>
+      </p:ext>
+    </p:extLst>
+  </p:cSld>
+  <p:clrMapOvr>
+    <a:masterClrMapping/>
+  </p:clrMapOvr>
+</p:sld>
+</file>
+
+<file path=ppt/slides/slide2.xml><?xml version="1.0" encoding="utf-8"?>
+<p:sld xmlns:a="http://schemas.openxmlformats.org/drawingml/2006/main" xmlns:r="http://schemas.openxmlformats.org/officeDocument/2006/relationships" xmlns:p="http://schemas.openxmlformats.org/presentationml/2006/main">
+  <p:cSld>
+    <p:spTree>
+      <p:nvGrpSpPr>
+        <p:cNvPr id="1" name=""/>
+        <p:cNvGrpSpPr/>
+        <p:nvPr/>
+      </p:nvGrpSpPr>
+      <p:grpSpPr>
+        <a:xfrm>
+          <a:off x="0" y="0"/>
+          <a:ext cx="0" cy="0"/>
+          <a:chOff x="0" y="0"/>
+          <a:chExt cx="0" cy="0"/>
+        </a:xfrm>
+      </p:grpSpPr>
+      <p:pic>
+        <p:nvPicPr>
+          <p:cNvPr id="1026" name="Picture 2">
+            <a:extLst>
+              <a:ext uri="{FF2B5EF4-FFF2-40B4-BE49-F238E27FC236}">
+                <a16:creationId xmlns:a16="http://schemas.microsoft.com/office/drawing/2014/main" id="{58F6080F-AEB7-4680-87C8-1B8285714B6C}"/>
+              </a:ext>
+            </a:extLst>
+          </p:cNvPr>
+          <p:cNvPicPr>
+            <a:picLocks noChangeAspect="1" noChangeArrowheads="1"/>
+          </p:cNvPicPr>
+          <p:nvPr/>
+        </p:nvPicPr>
+        <p:blipFill>
+          <a:blip r:embed="rId2">
+            <a:extLst>
+              <a:ext uri="{28A0092B-C50C-407E-A947-70E740481C1C}">
+                <a14:useLocalDpi xmlns:a14="http://schemas.microsoft.com/office/drawing/2010/main" val="0"/>
+              </a:ext>
+            </a:extLst>
+          </a:blip>
+          <a:srcRect/>
+          <a:stretch>
+            <a:fillRect/>
+          </a:stretch>
+        </p:blipFill>
+        <p:spPr bwMode="auto">
+          <a:xfrm>
+            <a:off x="411330" y="3314169"/>
+            <a:ext cx="4778039" cy="1480876"/>
+          </a:xfrm>
+          <a:prstGeom prst="rect">
+            <a:avLst/>
+          </a:prstGeom>
+          <a:noFill/>
+          <a:extLst>
+            <a:ext uri="{909E8E84-426E-40DD-AFC4-6F175D3DCCD1}">
+              <a14:hiddenFill xmlns:a14="http://schemas.microsoft.com/office/drawing/2010/main">
+                <a:solidFill>
+                  <a:srgbClr val="FFFFFF"/>
+                </a:solidFill>
+              </a14:hiddenFill>
+            </a:ext>
+          </a:extLst>
+        </p:spPr>
+      </p:pic>
+      <p:pic>
+        <p:nvPicPr>
+          <p:cNvPr id="1028" name="Picture 4">
+            <a:extLst>
+              <a:ext uri="{FF2B5EF4-FFF2-40B4-BE49-F238E27FC236}">
+                <a16:creationId xmlns:a16="http://schemas.microsoft.com/office/drawing/2014/main" id="{B5BE7111-7666-41FA-AE6C-659EE0FBC032}"/>
+              </a:ext>
+            </a:extLst>
+          </p:cNvPr>
+          <p:cNvPicPr>
+            <a:picLocks noChangeAspect="1" noChangeArrowheads="1"/>
+          </p:cNvPicPr>
+          <p:nvPr/>
+        </p:nvPicPr>
+        <p:blipFill>
+          <a:blip r:embed="rId3">
+            <a:extLst>
+              <a:ext uri="{28A0092B-C50C-407E-A947-70E740481C1C}">
+                <a14:useLocalDpi xmlns:a14="http://schemas.microsoft.com/office/drawing/2010/main" val="0"/>
+              </a:ext>
+            </a:extLst>
+          </a:blip>
+          <a:srcRect/>
+          <a:stretch>
+            <a:fillRect/>
+          </a:stretch>
+        </p:blipFill>
+        <p:spPr bwMode="auto">
+          <a:xfrm>
+            <a:off x="411329" y="6029398"/>
+            <a:ext cx="4778039" cy="1550489"/>
+          </a:xfrm>
+          <a:prstGeom prst="rect">
+            <a:avLst/>
+          </a:prstGeom>
+          <a:noFill/>
+          <a:extLst>
+            <a:ext uri="{909E8E84-426E-40DD-AFC4-6F175D3DCCD1}">
+              <a14:hiddenFill xmlns:a14="http://schemas.microsoft.com/office/drawing/2010/main">
+                <a:solidFill>
+                  <a:srgbClr val="FFFFFF"/>
+                </a:solidFill>
+              </a14:hiddenFill>
+            </a:ext>
+          </a:extLst>
+        </p:spPr>
+      </p:pic>
+      <p:pic>
+        <p:nvPicPr>
+          <p:cNvPr id="1030" name="Picture 6">
+            <a:extLst>
+              <a:ext uri="{FF2B5EF4-FFF2-40B4-BE49-F238E27FC236}">
+                <a16:creationId xmlns:a16="http://schemas.microsoft.com/office/drawing/2014/main" id="{9E9EF510-577C-41DE-953F-2E8A9798904A}"/>
+              </a:ext>
+            </a:extLst>
+          </p:cNvPr>
+          <p:cNvPicPr>
+            <a:picLocks noChangeAspect="1" noChangeArrowheads="1"/>
+          </p:cNvPicPr>
+          <p:nvPr/>
+        </p:nvPicPr>
+        <p:blipFill>
+          <a:blip r:embed="rId4">
+            <a:extLst>
+              <a:ext uri="{28A0092B-C50C-407E-A947-70E740481C1C}">
+                <a14:useLocalDpi xmlns:a14="http://schemas.microsoft.com/office/drawing/2010/main" val="0"/>
+              </a:ext>
+            </a:extLst>
+          </a:blip>
+          <a:srcRect/>
+          <a:stretch>
+            <a:fillRect/>
+          </a:stretch>
+        </p:blipFill>
+        <p:spPr bwMode="auto">
+          <a:xfrm>
+            <a:off x="4103370" y="4666215"/>
+            <a:ext cx="4778039" cy="1715031"/>
+          </a:xfrm>
+          <a:prstGeom prst="rect">
+            <a:avLst/>
+          </a:prstGeom>
+          <a:noFill/>
+          <a:extLst>
+            <a:ext uri="{909E8E84-426E-40DD-AFC4-6F175D3DCCD1}">
+              <a14:hiddenFill xmlns:a14="http://schemas.microsoft.com/office/drawing/2010/main">
+                <a:solidFill>
+                  <a:srgbClr val="FFFFFF"/>
+                </a:solidFill>
+              </a14:hiddenFill>
+            </a:ext>
+          </a:extLst>
+        </p:spPr>
+      </p:pic>
+      <p:pic>
+        <p:nvPicPr>
+          <p:cNvPr id="1032" name="Picture 8">
+            <a:extLst>
+              <a:ext uri="{FF2B5EF4-FFF2-40B4-BE49-F238E27FC236}">
+                <a16:creationId xmlns:a16="http://schemas.microsoft.com/office/drawing/2014/main" id="{ED101AA9-BEA6-4C91-BBCE-67A0F4CAAFCC}"/>
+              </a:ext>
+            </a:extLst>
+          </p:cNvPr>
+          <p:cNvPicPr>
+            <a:picLocks noChangeAspect="1" noChangeArrowheads="1"/>
+          </p:cNvPicPr>
+          <p:nvPr/>
+        </p:nvPicPr>
+        <p:blipFill>
+          <a:blip r:embed="rId5">
+            <a:extLst>
+              <a:ext uri="{28A0092B-C50C-407E-A947-70E740481C1C}">
+                <a14:useLocalDpi xmlns:a14="http://schemas.microsoft.com/office/drawing/2010/main" val="0"/>
+              </a:ext>
+            </a:extLst>
+          </a:blip>
+          <a:srcRect/>
+          <a:stretch>
+            <a:fillRect/>
+          </a:stretch>
+        </p:blipFill>
+        <p:spPr bwMode="auto">
+          <a:xfrm>
+            <a:off x="4103369" y="7579887"/>
+            <a:ext cx="4778039" cy="1550489"/>
+          </a:xfrm>
+          <a:prstGeom prst="rect">
+            <a:avLst/>
+          </a:prstGeom>
+          <a:noFill/>
+          <a:extLst>
+            <a:ext uri="{909E8E84-426E-40DD-AFC4-6F175D3DCCD1}">
+              <a14:hiddenFill xmlns:a14="http://schemas.microsoft.com/office/drawing/2010/main">
+                <a:solidFill>
+                  <a:srgbClr val="FFFFFF"/>
+                </a:solidFill>
+              </a14:hiddenFill>
+            </a:ext>
+          </a:extLst>
+        </p:spPr>
+      </p:pic>
+      <mc:AlternateContent xmlns:mc="http://schemas.openxmlformats.org/markup-compatibility/2006">
+        <mc:Choice xmlns:a14="http://schemas.microsoft.com/office/drawing/2010/main" Requires="a14">
+          <p:sp>
+            <p:nvSpPr>
+              <p:cNvPr id="4" name="TextBox 3">
+                <a:extLst>
+                  <a:ext uri="{FF2B5EF4-FFF2-40B4-BE49-F238E27FC236}">
+                    <a16:creationId xmlns:a16="http://schemas.microsoft.com/office/drawing/2014/main" id="{F52B75DD-C789-4C7A-86AD-D6A812B47BC6}"/>
+                  </a:ext>
+                </a:extLst>
+              </p:cNvPr>
+              <p:cNvSpPr txBox="1"/>
+              <p:nvPr/>
+            </p:nvSpPr>
+            <p:spPr>
+              <a:xfrm>
+                <a:off x="0" y="774385"/>
+                <a:ext cx="8206740" cy="1994905"/>
+              </a:xfrm>
+              <a:prstGeom prst="rect">
+                <a:avLst/>
+              </a:prstGeom>
+              <a:noFill/>
+            </p:spPr>
+            <p:txBody>
+              <a:bodyPr wrap="square" rtlCol="0">
+                <a:spAutoFit/>
+              </a:bodyPr>
+              <a:lstStyle/>
+              <a:p>
+                <a:pPr algn="ctr"/>
+                <a:r>
+                  <a:rPr lang="en-US" sz="2400" dirty="0">
+                    <a:latin typeface="+mj-lt"/>
+                  </a:rPr>
+                  <a:t>Mission Logistics Optimization</a:t>
+                </a:r>
+              </a:p>
+              <a:p>
+                <a:r>
+                  <a:rPr lang="en-US" dirty="0"/>
+                  <a:t>	</a:t>
+                </a:r>
+              </a:p>
+              <a:p>
+                <a:r>
+                  <a:rPr lang="en-US" dirty="0"/>
+                  <a:t>	</a:t>
+                </a:r>
+                <a:r>
+                  <a:rPr lang="en-US" sz="1600" b="1" dirty="0"/>
+                  <a:t>Objective:</a:t>
+                </a:r>
+                <a:r>
+                  <a:rPr lang="en-US" sz="1600" dirty="0"/>
+                  <a:t> Find Trajectory that minimizes the cost function:</a:t>
+                </a:r>
+              </a:p>
+              <a:p>
+                <a:r>
+                  <a:rPr lang="en-US" sz="1600" dirty="0"/>
+                  <a:t>		</a:t>
+                </a:r>
+              </a:p>
+              <a:p>
+                <a:pPr/>
+                <a14:m>
+                  <m:oMathPara xmlns:m="http://schemas.openxmlformats.org/officeDocument/2006/math">
+                    <m:oMathParaPr>
+                      <m:jc m:val="center"/>
+                    </m:oMathParaPr>
+                    <m:oMath xmlns:m="http://schemas.openxmlformats.org/officeDocument/2006/math">
+                      <m:r>
+                        <a:rPr lang="en-US" sz="1600" b="1" i="1" smtClean="0">
+                          <a:latin typeface="Cambria Math" panose="02040503050406030204" pitchFamily="18" charset="0"/>
+                        </a:rPr>
+                        <m:t>𝑱</m:t>
+                      </m:r>
+                      <m:r>
+                        <a:rPr lang="en-US" sz="1600" b="0" i="1" smtClean="0">
+                          <a:latin typeface="Cambria Math" panose="02040503050406030204" pitchFamily="18" charset="0"/>
+                        </a:rPr>
+                        <m:t>=</m:t>
+                      </m:r>
+                      <m:r>
+                        <a:rPr lang="en-US" sz="1600" b="0" i="1" smtClean="0">
+                          <a:latin typeface="Cambria Math" panose="02040503050406030204" pitchFamily="18" charset="0"/>
+                        </a:rPr>
+                        <m:t>𝑆</m:t>
+                      </m:r>
+                      <m:r>
+                        <a:rPr lang="en-US" sz="1600" b="0" i="1" baseline="-25000" smtClean="0">
+                          <a:latin typeface="Cambria Math" panose="02040503050406030204" pitchFamily="18" charset="0"/>
+                        </a:rPr>
+                        <m:t>1</m:t>
+                      </m:r>
+                      <m:r>
+                        <a:rPr lang="en-US" sz="1600" b="1" i="1" smtClean="0">
+                          <a:latin typeface="Cambria Math" panose="02040503050406030204" pitchFamily="18" charset="0"/>
+                          <a:ea typeface="Cambria Math" panose="02040503050406030204" pitchFamily="18" charset="0"/>
+                        </a:rPr>
+                        <m:t>𝒎</m:t>
+                      </m:r>
+                      <m:r>
+                        <a:rPr lang="en-US" sz="1600" b="1" i="1" baseline="-25000" smtClean="0">
+                          <a:latin typeface="Cambria Math" panose="02040503050406030204" pitchFamily="18" charset="0"/>
+                          <a:ea typeface="Cambria Math" panose="02040503050406030204" pitchFamily="18" charset="0"/>
+                        </a:rPr>
+                        <m:t>𝑬𝑬𝑽</m:t>
+                      </m:r>
+                      <m:r>
+                        <a:rPr lang="en-US" sz="1600" b="0" i="1" smtClean="0">
+                          <a:latin typeface="Cambria Math" panose="02040503050406030204" pitchFamily="18" charset="0"/>
+                          <a:ea typeface="Cambria Math" panose="02040503050406030204" pitchFamily="18" charset="0"/>
+                        </a:rPr>
+                        <m:t>+</m:t>
+                      </m:r>
+                      <m:r>
+                        <a:rPr lang="en-US" sz="1600" b="0" i="1" smtClean="0">
+                          <a:latin typeface="Cambria Math" panose="02040503050406030204" pitchFamily="18" charset="0"/>
+                          <a:ea typeface="Cambria Math" panose="02040503050406030204" pitchFamily="18" charset="0"/>
+                        </a:rPr>
+                        <m:t>𝑆</m:t>
+                      </m:r>
+                      <m:r>
+                        <a:rPr lang="en-US" sz="1600" b="0" i="1" baseline="-25000" smtClean="0">
+                          <a:latin typeface="Cambria Math" panose="02040503050406030204" pitchFamily="18" charset="0"/>
+                          <a:ea typeface="Cambria Math" panose="02040503050406030204" pitchFamily="18" charset="0"/>
+                        </a:rPr>
+                        <m:t>2</m:t>
+                      </m:r>
+                      <m:r>
+                        <a:rPr lang="en-US" sz="1600" b="1" i="1" smtClean="0">
+                          <a:latin typeface="Cambria Math" panose="02040503050406030204" pitchFamily="18" charset="0"/>
+                          <a:ea typeface="Cambria Math" panose="02040503050406030204" pitchFamily="18" charset="0"/>
+                        </a:rPr>
+                        <m:t>𝒎</m:t>
+                      </m:r>
+                      <m:r>
+                        <a:rPr lang="en-US" sz="1600" b="1" i="1" baseline="-25000" smtClean="0">
+                          <a:latin typeface="Cambria Math" panose="02040503050406030204" pitchFamily="18" charset="0"/>
+                          <a:ea typeface="Cambria Math" panose="02040503050406030204" pitchFamily="18" charset="0"/>
+                        </a:rPr>
+                        <m:t>𝑫𝑺𝑻</m:t>
+                      </m:r>
+                      <m:r>
+                        <a:rPr lang="en-US" sz="1600" b="0" i="1" smtClean="0">
+                          <a:latin typeface="Cambria Math" panose="02040503050406030204" pitchFamily="18" charset="0"/>
+                          <a:ea typeface="Cambria Math" panose="02040503050406030204" pitchFamily="18" charset="0"/>
+                        </a:rPr>
+                        <m:t>+</m:t>
+                      </m:r>
+                      <m:r>
+                        <a:rPr lang="en-US" sz="1600" b="0" i="1" smtClean="0">
+                          <a:latin typeface="Cambria Math" panose="02040503050406030204" pitchFamily="18" charset="0"/>
+                          <a:ea typeface="Cambria Math" panose="02040503050406030204" pitchFamily="18" charset="0"/>
+                        </a:rPr>
+                        <m:t>𝑆</m:t>
+                      </m:r>
+                      <m:r>
+                        <a:rPr lang="en-US" sz="1600" b="0" i="1" baseline="-25000" smtClean="0">
+                          <a:latin typeface="Cambria Math" panose="02040503050406030204" pitchFamily="18" charset="0"/>
+                          <a:ea typeface="Cambria Math" panose="02040503050406030204" pitchFamily="18" charset="0"/>
+                        </a:rPr>
+                        <m:t>3</m:t>
+                      </m:r>
+                      <m:r>
+                        <a:rPr lang="en-US" sz="1600" b="1" i="1" smtClean="0">
+                          <a:latin typeface="Cambria Math" panose="02040503050406030204" pitchFamily="18" charset="0"/>
+                          <a:ea typeface="Cambria Math" panose="02040503050406030204" pitchFamily="18" charset="0"/>
+                        </a:rPr>
+                        <m:t>𝒕</m:t>
+                      </m:r>
+                      <m:r>
+                        <a:rPr lang="en-US" sz="1600" b="1" i="1" baseline="-25000" smtClean="0">
+                          <a:latin typeface="Cambria Math" panose="02040503050406030204" pitchFamily="18" charset="0"/>
+                          <a:ea typeface="Cambria Math" panose="02040503050406030204" pitchFamily="18" charset="0"/>
+                        </a:rPr>
+                        <m:t>𝑷𝒉𝒐𝒃𝒐𝒔</m:t>
+                      </m:r>
+                      <m:r>
+                        <a:rPr lang="en-US" sz="1600" b="0" i="1" smtClean="0">
+                          <a:latin typeface="Cambria Math" panose="02040503050406030204" pitchFamily="18" charset="0"/>
+                          <a:ea typeface="Cambria Math" panose="02040503050406030204" pitchFamily="18" charset="0"/>
+                        </a:rPr>
+                        <m:t>+</m:t>
+                      </m:r>
+                      <m:r>
+                        <a:rPr lang="en-US" sz="1600" b="0" i="1" smtClean="0">
+                          <a:latin typeface="Cambria Math" panose="02040503050406030204" pitchFamily="18" charset="0"/>
+                          <a:ea typeface="Cambria Math" panose="02040503050406030204" pitchFamily="18" charset="0"/>
+                        </a:rPr>
+                        <m:t>𝑆</m:t>
+                      </m:r>
+                      <m:r>
+                        <a:rPr lang="en-US" sz="1600" b="0" i="1" baseline="-25000" smtClean="0">
+                          <a:latin typeface="Cambria Math" panose="02040503050406030204" pitchFamily="18" charset="0"/>
+                          <a:ea typeface="Cambria Math" panose="02040503050406030204" pitchFamily="18" charset="0"/>
+                        </a:rPr>
+                        <m:t>4</m:t>
+                      </m:r>
+                      <m:r>
+                        <a:rPr lang="en-US" sz="1600" b="1" i="1" smtClean="0">
+                          <a:latin typeface="Cambria Math" panose="02040503050406030204" pitchFamily="18" charset="0"/>
+                          <a:ea typeface="Cambria Math" panose="02040503050406030204" pitchFamily="18" charset="0"/>
+                        </a:rPr>
+                        <m:t>𝒕</m:t>
+                      </m:r>
+                      <m:r>
+                        <a:rPr lang="en-US" sz="1600" b="1" i="1" baseline="-25000" smtClean="0">
+                          <a:latin typeface="Cambria Math" panose="02040503050406030204" pitchFamily="18" charset="0"/>
+                          <a:ea typeface="Cambria Math" panose="02040503050406030204" pitchFamily="18" charset="0"/>
+                        </a:rPr>
+                        <m:t>𝑫𝒆𝒊𝒎𝒐𝒔</m:t>
+                      </m:r>
+                      <m:r>
+                        <a:rPr lang="en-US" sz="1600" b="0" i="1" smtClean="0">
+                          <a:latin typeface="Cambria Math" panose="02040503050406030204" pitchFamily="18" charset="0"/>
+                          <a:ea typeface="Cambria Math" panose="02040503050406030204" pitchFamily="18" charset="0"/>
+                        </a:rPr>
+                        <m:t> </m:t>
+                      </m:r>
+                    </m:oMath>
+                  </m:oMathPara>
+                </a14:m>
+                <a:endParaRPr lang="en-US" sz="1600" b="0" baseline="-25000" dirty="0">
+                  <a:ea typeface="Cambria Math" panose="02040503050406030204" pitchFamily="18" charset="0"/>
+                </a:endParaRPr>
+              </a:p>
+              <a:p>
+                <a:pPr/>
+                <a:r>
+                  <a:rPr lang="en-US" sz="1600" b="0" dirty="0">
+                    <a:ea typeface="Cambria Math" panose="02040503050406030204" pitchFamily="18" charset="0"/>
+                  </a:rPr>
+                  <a:t>	</a:t>
+                </a:r>
+              </a:p>
+              <a:p>
+                <a:pPr/>
+                <a:r>
+                  <a:rPr lang="en-US" sz="1600" dirty="0">
+                    <a:ea typeface="Cambria Math" panose="02040503050406030204" pitchFamily="18" charset="0"/>
+                  </a:rPr>
+                  <a:t>	</a:t>
+                </a:r>
+                <a:r>
+                  <a:rPr lang="en-US" sz="1600" b="0" dirty="0">
+                    <a:ea typeface="Cambria Math" panose="02040503050406030204" pitchFamily="18" charset="0"/>
+                  </a:rPr>
+                  <a:t>Rocket Eqn. used to convert </a:t>
+                </a:r>
+                <a:r>
+                  <a:rPr lang="el-GR" sz="1600" b="0" dirty="0">
+                    <a:ea typeface="Cambria Math" panose="02040503050406030204" pitchFamily="18" charset="0"/>
+                  </a:rPr>
+                  <a:t>Δ</a:t>
+                </a:r>
+                <a:r>
+                  <a:rPr lang="en-US" sz="1600" b="0" dirty="0">
+                    <a:ea typeface="Cambria Math" panose="02040503050406030204" pitchFamily="18" charset="0"/>
+                  </a:rPr>
+                  <a:t>V to mass </a:t>
+                </a:r>
+              </a:p>
+            </p:txBody>
+          </p:sp>
+        </mc:Choice>
+        <mc:Fallback>
+          <p:sp>
+            <p:nvSpPr>
+              <p:cNvPr id="4" name="TextBox 3">
+                <a:extLst>
+                  <a:ext uri="{FF2B5EF4-FFF2-40B4-BE49-F238E27FC236}">
+                    <a16:creationId xmlns:a16="http://schemas.microsoft.com/office/drawing/2014/main" id="{F52B75DD-C789-4C7A-86AD-D6A812B47BC6}"/>
+                  </a:ext>
+                </a:extLst>
+              </p:cNvPr>
+              <p:cNvSpPr txBox="1">
+                <a:spLocks noRot="1" noChangeAspect="1" noMove="1" noResize="1" noEditPoints="1" noAdjustHandles="1" noChangeArrowheads="1" noChangeShapeType="1" noTextEdit="1"/>
+              </p:cNvSpPr>
+              <p:nvPr/>
+            </p:nvSpPr>
+            <p:spPr>
+              <a:xfrm>
+                <a:off x="0" y="774385"/>
+                <a:ext cx="8206740" cy="1994905"/>
+              </a:xfrm>
+              <a:prstGeom prst="rect">
+                <a:avLst/>
+              </a:prstGeom>
+              <a:blipFill>
+                <a:blip r:embed="rId6"/>
+                <a:stretch>
+                  <a:fillRect t="-2446" b="-3058"/>
+                </a:stretch>
+              </a:blipFill>
+            </p:spPr>
+            <p:txBody>
+              <a:bodyPr/>
+              <a:lstStyle/>
+              <a:p>
+                <a:r>
+                  <a:rPr lang="en-US">
+                    <a:noFill/>
+                  </a:rPr>
+                  <a:t> </a:t>
+                </a:r>
+              </a:p>
+            </p:txBody>
+          </p:sp>
+        </mc:Fallback>
+      </mc:AlternateContent>
+      <mc:AlternateContent xmlns:mc="http://schemas.openxmlformats.org/markup-compatibility/2006">
+        <mc:Choice xmlns:a14="http://schemas.microsoft.com/office/drawing/2010/main" Requires="a14">
+          <p:sp>
+            <p:nvSpPr>
+              <p:cNvPr id="6" name="TextBox 5">
+                <a:extLst>
+                  <a:ext uri="{FF2B5EF4-FFF2-40B4-BE49-F238E27FC236}">
+                    <a16:creationId xmlns:a16="http://schemas.microsoft.com/office/drawing/2014/main" id="{23BEC90C-2B65-4856-8827-8409D7E23547}"/>
+                  </a:ext>
+                </a:extLst>
+              </p:cNvPr>
+              <p:cNvSpPr txBox="1"/>
+              <p:nvPr/>
+            </p:nvSpPr>
+            <p:spPr>
+              <a:xfrm>
+                <a:off x="6332220" y="1634692"/>
+                <a:ext cx="2114550" cy="2123658"/>
+              </a:xfrm>
+              <a:prstGeom prst="rect">
+                <a:avLst/>
+              </a:prstGeom>
+              <a:noFill/>
+            </p:spPr>
+            <p:txBody>
+              <a:bodyPr wrap="square" rtlCol="0">
+                <a:spAutoFit/>
+              </a:bodyPr>
+              <a:lstStyle/>
+              <a:p>
+                <a14:m>
+                  <m:oMath xmlns:m="http://schemas.openxmlformats.org/officeDocument/2006/math">
+                    <m:r>
+                      <a:rPr lang="en-US" sz="1200" b="1" i="1" smtClean="0">
+                        <a:latin typeface="Cambria Math" panose="02040503050406030204" pitchFamily="18" charset="0"/>
+                        <a:ea typeface="Cambria Math" panose="02040503050406030204" pitchFamily="18" charset="0"/>
+                      </a:rPr>
+                      <m:t>𝒎</m:t>
+                    </m:r>
+                    <m:r>
+                      <a:rPr lang="en-US" sz="1200" b="1" i="1" baseline="-25000">
+                        <a:latin typeface="Cambria Math" panose="02040503050406030204" pitchFamily="18" charset="0"/>
+                        <a:ea typeface="Cambria Math" panose="02040503050406030204" pitchFamily="18" charset="0"/>
+                      </a:rPr>
+                      <m:t>𝑬𝑬𝑽</m:t>
+                    </m:r>
+                  </m:oMath>
+                </a14:m>
+                <a:r>
+                  <a:rPr lang="en-US" sz="1200" dirty="0"/>
+                  <a:t> – Required propellant mass capacity of the EEV</a:t>
+                </a:r>
+              </a:p>
+              <a:p>
+                <a:pPr/>
+                <a14:m>
+                  <m:oMath xmlns:m="http://schemas.openxmlformats.org/officeDocument/2006/math">
+                    <m:r>
+                      <a:rPr lang="en-US" sz="1200" b="1" i="1" smtClean="0">
+                        <a:latin typeface="Cambria Math" panose="02040503050406030204" pitchFamily="18" charset="0"/>
+                        <a:ea typeface="Cambria Math" panose="02040503050406030204" pitchFamily="18" charset="0"/>
+                      </a:rPr>
+                      <m:t>𝒎</m:t>
+                    </m:r>
+                    <m:r>
+                      <a:rPr lang="en-US" sz="1200" b="1" i="1" baseline="-25000" smtClean="0">
+                        <a:latin typeface="Cambria Math" panose="02040503050406030204" pitchFamily="18" charset="0"/>
+                        <a:ea typeface="Cambria Math" panose="02040503050406030204" pitchFamily="18" charset="0"/>
+                      </a:rPr>
+                      <m:t>𝑫𝑺𝑻</m:t>
+                    </m:r>
+                  </m:oMath>
+                </a14:m>
+                <a:r>
+                  <a:rPr lang="en-US" sz="1200" dirty="0"/>
+                  <a:t> – Required propellant mass capacity of the DST</a:t>
+                </a:r>
+              </a:p>
+              <a:p>
+                <a:pPr/>
+                <a14:m>
+                  <m:oMath xmlns:m="http://schemas.openxmlformats.org/officeDocument/2006/math">
+                    <m:r>
+                      <a:rPr lang="en-US" sz="1200" b="1" i="1">
+                        <a:latin typeface="Cambria Math" panose="02040503050406030204" pitchFamily="18" charset="0"/>
+                        <a:ea typeface="Cambria Math" panose="02040503050406030204" pitchFamily="18" charset="0"/>
+                      </a:rPr>
+                      <m:t>𝒕</m:t>
+                    </m:r>
+                    <m:r>
+                      <a:rPr lang="en-US" sz="1200" b="1" i="1" baseline="-25000">
+                        <a:latin typeface="Cambria Math" panose="02040503050406030204" pitchFamily="18" charset="0"/>
+                        <a:ea typeface="Cambria Math" panose="02040503050406030204" pitchFamily="18" charset="0"/>
+                      </a:rPr>
+                      <m:t>𝑷𝒉𝒐𝒃𝒐𝒔</m:t>
+                    </m:r>
+                  </m:oMath>
+                </a14:m>
+                <a:r>
+                  <a:rPr lang="en-US" sz="1200" dirty="0"/>
+                  <a:t> – Science time on Phobos (days)</a:t>
+                </a:r>
+              </a:p>
+              <a:p>
+                <a:pPr/>
+                <a14:m>
+                  <m:oMath xmlns:m="http://schemas.openxmlformats.org/officeDocument/2006/math">
+                    <m:r>
+                      <a:rPr lang="en-US" sz="1200" b="1" i="1">
+                        <a:latin typeface="Cambria Math" panose="02040503050406030204" pitchFamily="18" charset="0"/>
+                        <a:ea typeface="Cambria Math" panose="02040503050406030204" pitchFamily="18" charset="0"/>
+                      </a:rPr>
+                      <m:t>𝒕</m:t>
+                    </m:r>
+                    <m:r>
+                      <a:rPr lang="en-US" sz="1200" b="1" i="1" baseline="-25000">
+                        <a:latin typeface="Cambria Math" panose="02040503050406030204" pitchFamily="18" charset="0"/>
+                        <a:ea typeface="Cambria Math" panose="02040503050406030204" pitchFamily="18" charset="0"/>
+                      </a:rPr>
+                      <m:t>𝑫𝒆𝒊𝒎𝒐𝒔</m:t>
+                    </m:r>
+                  </m:oMath>
+                </a14:m>
+                <a:r>
+                  <a:rPr lang="en-US" sz="1200" dirty="0"/>
+                  <a:t> – Science time of Deimos (days)</a:t>
+                </a:r>
+              </a:p>
+              <a:p>
+                <a:pPr/>
+                <a:endParaRPr lang="en-US" sz="1200" dirty="0"/>
+              </a:p>
+              <a:p>
+                <a:pPr/>
+                <a:endParaRPr lang="en-US" sz="1200" dirty="0"/>
+              </a:p>
+              <a:p>
+                <a:pPr/>
+                <a:endParaRPr lang="en-US" sz="1200" dirty="0"/>
+              </a:p>
+            </p:txBody>
+          </p:sp>
+        </mc:Choice>
+        <mc:Fallback>
+          <p:sp>
+            <p:nvSpPr>
+              <p:cNvPr id="6" name="TextBox 5">
+                <a:extLst>
+                  <a:ext uri="{FF2B5EF4-FFF2-40B4-BE49-F238E27FC236}">
+                    <a16:creationId xmlns:a16="http://schemas.microsoft.com/office/drawing/2014/main" id="{23BEC90C-2B65-4856-8827-8409D7E23547}"/>
+                  </a:ext>
+                </a:extLst>
+              </p:cNvPr>
+              <p:cNvSpPr txBox="1">
+                <a:spLocks noRot="1" noChangeAspect="1" noMove="1" noResize="1" noEditPoints="1" noAdjustHandles="1" noChangeArrowheads="1" noChangeShapeType="1" noTextEdit="1"/>
+              </p:cNvSpPr>
+              <p:nvPr/>
+            </p:nvSpPr>
+            <p:spPr>
+              <a:xfrm>
+                <a:off x="6332220" y="1634692"/>
+                <a:ext cx="2114550" cy="2123658"/>
+              </a:xfrm>
+              <a:prstGeom prst="rect">
+                <a:avLst/>
+              </a:prstGeom>
+              <a:blipFill>
+                <a:blip r:embed="rId7"/>
+                <a:stretch>
+                  <a:fillRect l="-288"/>
+                </a:stretch>
+              </a:blipFill>
+            </p:spPr>
+            <p:txBody>
+              <a:bodyPr/>
+              <a:lstStyle/>
+              <a:p>
+                <a:r>
+                  <a:rPr lang="en-US">
+                    <a:noFill/>
+                  </a:rPr>
+                  <a:t> </a:t>
+                </a:r>
+              </a:p>
+            </p:txBody>
+          </p:sp>
+        </mc:Fallback>
+      </mc:AlternateContent>
+      <mc:AlternateContent xmlns:mc="http://schemas.openxmlformats.org/markup-compatibility/2006">
+        <mc:Choice xmlns:a14="http://schemas.microsoft.com/office/drawing/2010/main" Requires="a14">
+          <p:sp>
+            <p:nvSpPr>
+              <p:cNvPr id="7" name="TextBox 6">
+                <a:extLst>
+                  <a:ext uri="{FF2B5EF4-FFF2-40B4-BE49-F238E27FC236}">
+                    <a16:creationId xmlns:a16="http://schemas.microsoft.com/office/drawing/2014/main" id="{70B7DB2C-D7D7-4061-87A7-41EB2003D7A7}"/>
+                  </a:ext>
+                </a:extLst>
+              </p:cNvPr>
+              <p:cNvSpPr txBox="1"/>
+              <p:nvPr/>
+            </p:nvSpPr>
+            <p:spPr>
+              <a:xfrm>
+                <a:off x="5189368" y="3325603"/>
+                <a:ext cx="3482192" cy="1569660"/>
+              </a:xfrm>
+              <a:prstGeom prst="rect">
+                <a:avLst/>
+              </a:prstGeom>
+              <a:noFill/>
+            </p:spPr>
+            <p:txBody>
+              <a:bodyPr wrap="square" rtlCol="0">
+                <a:spAutoFit/>
+              </a:bodyPr>
+              <a:lstStyle/>
+              <a:p>
+                <a:r>
+                  <a:rPr lang="en-US" sz="1200" b="1" dirty="0"/>
+                  <a:t>1. </a:t>
+                </a:r>
+                <a:r>
+                  <a:rPr lang="en-US" sz="1200" dirty="0"/>
+                  <a:t>Deimos to Phobos, no stop at DST.  </a:t>
+                </a:r>
+                <a14:m>
+                  <m:oMath xmlns:m="http://schemas.openxmlformats.org/officeDocument/2006/math">
+                    <m:r>
+                      <a:rPr lang="en-US" sz="1200" b="1" i="1">
+                        <a:latin typeface="Cambria Math" panose="02040503050406030204" pitchFamily="18" charset="0"/>
+                      </a:rPr>
+                      <m:t>𝑱</m:t>
+                    </m:r>
+                  </m:oMath>
+                </a14:m>
+                <a:r>
+                  <a:rPr lang="en-US" sz="1200" dirty="0"/>
+                  <a:t> = 16,898</a:t>
+                </a:r>
+              </a:p>
+              <a:p>
+                <a:endParaRPr lang="en-US" sz="1200" dirty="0"/>
+              </a:p>
+              <a:p>
+                <a:r>
+                  <a:rPr lang="el-GR" sz="1200" b="1" dirty="0">
+                    <a:ea typeface="Cambria Math" panose="02040503050406030204" pitchFamily="18" charset="0"/>
+                  </a:rPr>
+                  <a:t>Δ</a:t>
+                </a:r>
+                <a:r>
+                  <a:rPr lang="en-US" sz="1200" b="1" dirty="0">
+                    <a:ea typeface="Cambria Math" panose="02040503050406030204" pitchFamily="18" charset="0"/>
+                  </a:rPr>
+                  <a:t>V</a:t>
+                </a:r>
+                <a:r>
+                  <a:rPr lang="en-US" sz="1200" dirty="0">
+                    <a:ea typeface="Cambria Math" panose="02040503050406030204" pitchFamily="18" charset="0"/>
+                  </a:rPr>
+                  <a:t> = 2.41 km/s</a:t>
+                </a:r>
+              </a:p>
+              <a:p>
+                <a14:m>
+                  <m:oMath xmlns:m="http://schemas.openxmlformats.org/officeDocument/2006/math">
+                    <m:r>
+                      <a:rPr lang="en-US" sz="1200" b="1" i="1">
+                        <a:latin typeface="Cambria Math" panose="02040503050406030204" pitchFamily="18" charset="0"/>
+                        <a:ea typeface="Cambria Math" panose="02040503050406030204" pitchFamily="18" charset="0"/>
+                      </a:rPr>
+                      <m:t>𝒎</m:t>
+                    </m:r>
+                    <m:r>
+                      <a:rPr lang="en-US" sz="1200" b="1" i="1" baseline="-25000">
+                        <a:latin typeface="Cambria Math" panose="02040503050406030204" pitchFamily="18" charset="0"/>
+                        <a:ea typeface="Cambria Math" panose="02040503050406030204" pitchFamily="18" charset="0"/>
+                      </a:rPr>
+                      <m:t>𝑬𝑬𝑽</m:t>
+                    </m:r>
+                  </m:oMath>
+                </a14:m>
+                <a:r>
+                  <a:rPr lang="en-US" sz="1200" dirty="0"/>
+                  <a:t> = 10,103 kg</a:t>
+                </a:r>
+              </a:p>
+              <a:p>
+                <a14:m>
+                  <m:oMath xmlns:m="http://schemas.openxmlformats.org/officeDocument/2006/math">
+                    <m:r>
+                      <a:rPr lang="en-US" sz="1200" b="1" i="1">
+                        <a:latin typeface="Cambria Math" panose="02040503050406030204" pitchFamily="18" charset="0"/>
+                        <a:ea typeface="Cambria Math" panose="02040503050406030204" pitchFamily="18" charset="0"/>
+                      </a:rPr>
+                      <m:t>𝒎</m:t>
+                    </m:r>
+                    <m:r>
+                      <a:rPr lang="en-US" sz="1200" b="1" i="1" baseline="-25000">
+                        <a:latin typeface="Cambria Math" panose="02040503050406030204" pitchFamily="18" charset="0"/>
+                        <a:ea typeface="Cambria Math" panose="02040503050406030204" pitchFamily="18" charset="0"/>
+                      </a:rPr>
+                      <m:t>𝑫𝑺𝑻</m:t>
+                    </m:r>
+                  </m:oMath>
+                </a14:m>
+                <a:r>
+                  <a:rPr lang="en-US" sz="1200" dirty="0"/>
+                  <a:t> = 0 kg</a:t>
+                </a:r>
+              </a:p>
+              <a:p>
+                <a14:m>
+                  <m:oMath xmlns:m="http://schemas.openxmlformats.org/officeDocument/2006/math">
+                    <m:r>
+                      <a:rPr lang="en-US" sz="1200" b="1" i="1">
+                        <a:latin typeface="Cambria Math" panose="02040503050406030204" pitchFamily="18" charset="0"/>
+                        <a:ea typeface="Cambria Math" panose="02040503050406030204" pitchFamily="18" charset="0"/>
+                      </a:rPr>
+                      <m:t>𝒕</m:t>
+                    </m:r>
+                    <m:r>
+                      <a:rPr lang="en-US" sz="1200" b="1" i="1" baseline="-25000">
+                        <a:latin typeface="Cambria Math" panose="02040503050406030204" pitchFamily="18" charset="0"/>
+                        <a:ea typeface="Cambria Math" panose="02040503050406030204" pitchFamily="18" charset="0"/>
+                      </a:rPr>
+                      <m:t>𝑷𝒉𝒐𝒃𝒐𝒔</m:t>
+                    </m:r>
+                  </m:oMath>
+                </a14:m>
+                <a:r>
+                  <a:rPr lang="en-US" sz="1200" dirty="0"/>
+                  <a:t> = 11.32 days</a:t>
+                </a:r>
+              </a:p>
+              <a:p>
+                <a14:m>
+                  <m:oMath xmlns:m="http://schemas.openxmlformats.org/officeDocument/2006/math">
+                    <m:r>
+                      <a:rPr lang="en-US" sz="1200" b="1" i="1">
+                        <a:latin typeface="Cambria Math" panose="02040503050406030204" pitchFamily="18" charset="0"/>
+                        <a:ea typeface="Cambria Math" panose="02040503050406030204" pitchFamily="18" charset="0"/>
+                      </a:rPr>
+                      <m:t>𝒕</m:t>
+                    </m:r>
+                    <m:r>
+                      <a:rPr lang="en-US" sz="1200" b="1" i="1" baseline="-25000">
+                        <a:latin typeface="Cambria Math" panose="02040503050406030204" pitchFamily="18" charset="0"/>
+                        <a:ea typeface="Cambria Math" panose="02040503050406030204" pitchFamily="18" charset="0"/>
+                      </a:rPr>
+                      <m:t>𝑫𝒆𝒊𝒎𝒐𝒔</m:t>
+                    </m:r>
+                  </m:oMath>
+                </a14:m>
+                <a:r>
+                  <a:rPr lang="en-US" sz="1200" dirty="0"/>
+                  <a:t> = 7.56 days</a:t>
+                </a:r>
+              </a:p>
+              <a:p>
+                <a:r>
+                  <a:rPr lang="en-US" sz="1200" b="1" dirty="0"/>
+                  <a:t>					</a:t>
+                </a:r>
+                <a:endParaRPr lang="en-US" sz="1200" dirty="0"/>
+              </a:p>
+            </p:txBody>
+          </p:sp>
+        </mc:Choice>
+        <mc:Fallback>
+          <p:sp>
+            <p:nvSpPr>
+              <p:cNvPr id="7" name="TextBox 6">
+                <a:extLst>
+                  <a:ext uri="{FF2B5EF4-FFF2-40B4-BE49-F238E27FC236}">
+                    <a16:creationId xmlns:a16="http://schemas.microsoft.com/office/drawing/2014/main" id="{70B7DB2C-D7D7-4061-87A7-41EB2003D7A7}"/>
+                  </a:ext>
+                </a:extLst>
+              </p:cNvPr>
+              <p:cNvSpPr txBox="1">
+                <a:spLocks noRot="1" noChangeAspect="1" noMove="1" noResize="1" noEditPoints="1" noAdjustHandles="1" noChangeArrowheads="1" noChangeShapeType="1" noTextEdit="1"/>
+              </p:cNvSpPr>
+              <p:nvPr/>
+            </p:nvSpPr>
+            <p:spPr>
+              <a:xfrm>
+                <a:off x="5189368" y="3325603"/>
+                <a:ext cx="3482192" cy="1569660"/>
+              </a:xfrm>
+              <a:prstGeom prst="rect">
+                <a:avLst/>
+              </a:prstGeom>
+              <a:blipFill>
+                <a:blip r:embed="rId8"/>
+                <a:stretch>
+                  <a:fillRect t="-389"/>
+                </a:stretch>
+              </a:blipFill>
+            </p:spPr>
+            <p:txBody>
+              <a:bodyPr/>
+              <a:lstStyle/>
+              <a:p>
+                <a:r>
+                  <a:rPr lang="en-US">
+                    <a:noFill/>
+                  </a:rPr>
+                  <a:t> </a:t>
+                </a:r>
+              </a:p>
+            </p:txBody>
+          </p:sp>
+        </mc:Fallback>
+      </mc:AlternateContent>
+      <mc:AlternateContent xmlns:mc="http://schemas.openxmlformats.org/markup-compatibility/2006">
+        <mc:Choice xmlns:a14="http://schemas.microsoft.com/office/drawing/2010/main" Requires="a14">
+          <p:sp>
+            <p:nvSpPr>
+              <p:cNvPr id="12" name="TextBox 11">
+                <a:extLst>
+                  <a:ext uri="{FF2B5EF4-FFF2-40B4-BE49-F238E27FC236}">
+                    <a16:creationId xmlns:a16="http://schemas.microsoft.com/office/drawing/2014/main" id="{A45704C6-D3CB-4486-98E9-60A1CAC1D7DB}"/>
+                  </a:ext>
+                </a:extLst>
+              </p:cNvPr>
+              <p:cNvSpPr txBox="1"/>
+              <p:nvPr/>
+            </p:nvSpPr>
+            <p:spPr>
+              <a:xfrm>
+                <a:off x="621177" y="4802001"/>
+                <a:ext cx="3482192" cy="1569660"/>
+              </a:xfrm>
+              <a:prstGeom prst="rect">
+                <a:avLst/>
+              </a:prstGeom>
+              <a:noFill/>
+            </p:spPr>
+            <p:txBody>
+              <a:bodyPr wrap="square" rtlCol="0">
+                <a:spAutoFit/>
+              </a:bodyPr>
+              <a:lstStyle/>
+              <a:p>
+                <a:pPr algn="r"/>
+                <a:r>
+                  <a:rPr lang="en-US" sz="1200" b="1" dirty="0"/>
+                  <a:t>2. </a:t>
+                </a:r>
+                <a:r>
+                  <a:rPr lang="en-US" sz="1200" dirty="0"/>
+                  <a:t>Deimos to Phobos, refuel at DST.  </a:t>
+                </a:r>
+                <a14:m>
+                  <m:oMath xmlns:m="http://schemas.openxmlformats.org/officeDocument/2006/math">
+                    <m:r>
+                      <a:rPr lang="en-US" sz="1200" b="1" i="1">
+                        <a:latin typeface="Cambria Math" panose="02040503050406030204" pitchFamily="18" charset="0"/>
+                      </a:rPr>
+                      <m:t>𝑱</m:t>
+                    </m:r>
+                  </m:oMath>
+                </a14:m>
+                <a:r>
+                  <a:rPr lang="en-US" sz="1200" dirty="0"/>
+                  <a:t> = 11,897</a:t>
+                </a:r>
+              </a:p>
+              <a:p>
+                <a:pPr algn="r"/>
+                <a:endParaRPr lang="en-US" sz="1200" dirty="0"/>
+              </a:p>
+              <a:p>
+                <a:pPr algn="r"/>
+                <a:r>
+                  <a:rPr lang="el-GR" sz="1200" b="1" dirty="0">
+                    <a:ea typeface="Cambria Math" panose="02040503050406030204" pitchFamily="18" charset="0"/>
+                  </a:rPr>
+                  <a:t>Δ</a:t>
+                </a:r>
+                <a:r>
+                  <a:rPr lang="en-US" sz="1200" b="1" dirty="0">
+                    <a:ea typeface="Cambria Math" panose="02040503050406030204" pitchFamily="18" charset="0"/>
+                  </a:rPr>
+                  <a:t>V</a:t>
+                </a:r>
+                <a:r>
+                  <a:rPr lang="en-US" sz="1200" dirty="0">
+                    <a:ea typeface="Cambria Math" panose="02040503050406030204" pitchFamily="18" charset="0"/>
+                  </a:rPr>
+                  <a:t> = 1.80 km/s</a:t>
+                </a:r>
+              </a:p>
+              <a:p>
+                <a:pPr algn="r"/>
+                <a14:m>
+                  <m:oMath xmlns:m="http://schemas.openxmlformats.org/officeDocument/2006/math">
+                    <m:r>
+                      <a:rPr lang="en-US" sz="1200" b="1" i="1">
+                        <a:latin typeface="Cambria Math" panose="02040503050406030204" pitchFamily="18" charset="0"/>
+                        <a:ea typeface="Cambria Math" panose="02040503050406030204" pitchFamily="18" charset="0"/>
+                      </a:rPr>
+                      <m:t>𝒎</m:t>
+                    </m:r>
+                    <m:r>
+                      <a:rPr lang="en-US" sz="1200" b="1" i="1" baseline="-25000">
+                        <a:latin typeface="Cambria Math" panose="02040503050406030204" pitchFamily="18" charset="0"/>
+                        <a:ea typeface="Cambria Math" panose="02040503050406030204" pitchFamily="18" charset="0"/>
+                      </a:rPr>
+                      <m:t>𝑬𝑬𝑽</m:t>
+                    </m:r>
+                  </m:oMath>
+                </a14:m>
+                <a:r>
+                  <a:rPr lang="en-US" sz="1200" dirty="0"/>
+                  <a:t> = 6,727 kg</a:t>
+                </a:r>
+              </a:p>
+              <a:p>
+                <a:pPr algn="r"/>
+                <a14:m>
+                  <m:oMath xmlns:m="http://schemas.openxmlformats.org/officeDocument/2006/math">
+                    <m:r>
+                      <a:rPr lang="en-US" sz="1200" b="1" i="1">
+                        <a:latin typeface="Cambria Math" panose="02040503050406030204" pitchFamily="18" charset="0"/>
+                        <a:ea typeface="Cambria Math" panose="02040503050406030204" pitchFamily="18" charset="0"/>
+                      </a:rPr>
+                      <m:t>𝒎</m:t>
+                    </m:r>
+                    <m:r>
+                      <a:rPr lang="en-US" sz="1200" b="1" i="1" baseline="-25000">
+                        <a:latin typeface="Cambria Math" panose="02040503050406030204" pitchFamily="18" charset="0"/>
+                        <a:ea typeface="Cambria Math" panose="02040503050406030204" pitchFamily="18" charset="0"/>
+                      </a:rPr>
+                      <m:t>𝑫𝑺𝑻</m:t>
+                    </m:r>
+                  </m:oMath>
+                </a14:m>
+                <a:r>
+                  <a:rPr lang="en-US" sz="1200" dirty="0"/>
+                  <a:t> = 3,793 kg</a:t>
+                </a:r>
+              </a:p>
+              <a:p>
+                <a:pPr algn="r"/>
+                <a14:m>
+                  <m:oMath xmlns:m="http://schemas.openxmlformats.org/officeDocument/2006/math">
+                    <m:r>
+                      <a:rPr lang="en-US" sz="1200" b="1" i="1">
+                        <a:latin typeface="Cambria Math" panose="02040503050406030204" pitchFamily="18" charset="0"/>
+                        <a:ea typeface="Cambria Math" panose="02040503050406030204" pitchFamily="18" charset="0"/>
+                      </a:rPr>
+                      <m:t>𝒕</m:t>
+                    </m:r>
+                    <m:r>
+                      <a:rPr lang="en-US" sz="1200" b="1" i="1" baseline="-25000">
+                        <a:latin typeface="Cambria Math" panose="02040503050406030204" pitchFamily="18" charset="0"/>
+                        <a:ea typeface="Cambria Math" panose="02040503050406030204" pitchFamily="18" charset="0"/>
+                      </a:rPr>
+                      <m:t>𝑷𝒉𝒐𝒃𝒐𝒔</m:t>
+                    </m:r>
+                  </m:oMath>
+                </a14:m>
+                <a:r>
+                  <a:rPr lang="en-US" sz="1200" dirty="0"/>
+                  <a:t> = 9.25 days</a:t>
+                </a:r>
+              </a:p>
+              <a:p>
+                <a:pPr algn="r"/>
+                <a14:m>
+                  <m:oMath xmlns:m="http://schemas.openxmlformats.org/officeDocument/2006/math">
+                    <m:r>
+                      <a:rPr lang="en-US" sz="1200" b="1" i="1">
+                        <a:latin typeface="Cambria Math" panose="02040503050406030204" pitchFamily="18" charset="0"/>
+                        <a:ea typeface="Cambria Math" panose="02040503050406030204" pitchFamily="18" charset="0"/>
+                      </a:rPr>
+                      <m:t>𝒕</m:t>
+                    </m:r>
+                    <m:r>
+                      <a:rPr lang="en-US" sz="1200" b="1" i="1" baseline="-25000">
+                        <a:latin typeface="Cambria Math" panose="02040503050406030204" pitchFamily="18" charset="0"/>
+                        <a:ea typeface="Cambria Math" panose="02040503050406030204" pitchFamily="18" charset="0"/>
+                      </a:rPr>
+                      <m:t>𝑫𝒆𝒊𝒎𝒐𝒔</m:t>
+                    </m:r>
+                  </m:oMath>
+                </a14:m>
+                <a:r>
+                  <a:rPr lang="en-US" sz="1200" dirty="0"/>
+                  <a:t> = 3.63 days</a:t>
+                </a:r>
+              </a:p>
+              <a:p>
+                <a:pPr algn="r"/>
+                <a:r>
+                  <a:rPr lang="en-US" sz="1200" b="1" dirty="0"/>
+                  <a:t>					</a:t>
+                </a:r>
+                <a:endParaRPr lang="en-US" sz="1200" dirty="0"/>
+              </a:p>
+            </p:txBody>
+          </p:sp>
+        </mc:Choice>
+        <mc:Fallback>
+          <p:sp>
+            <p:nvSpPr>
+              <p:cNvPr id="12" name="TextBox 11">
+                <a:extLst>
+                  <a:ext uri="{FF2B5EF4-FFF2-40B4-BE49-F238E27FC236}">
+                    <a16:creationId xmlns:a16="http://schemas.microsoft.com/office/drawing/2014/main" id="{A45704C6-D3CB-4486-98E9-60A1CAC1D7DB}"/>
+                  </a:ext>
+                </a:extLst>
+              </p:cNvPr>
+              <p:cNvSpPr txBox="1">
+                <a:spLocks noRot="1" noChangeAspect="1" noMove="1" noResize="1" noEditPoints="1" noAdjustHandles="1" noChangeArrowheads="1" noChangeShapeType="1" noTextEdit="1"/>
+              </p:cNvSpPr>
+              <p:nvPr/>
+            </p:nvSpPr>
+            <p:spPr>
+              <a:xfrm>
+                <a:off x="621177" y="4802001"/>
+                <a:ext cx="3482192" cy="1569660"/>
+              </a:xfrm>
+              <a:prstGeom prst="rect">
+                <a:avLst/>
+              </a:prstGeom>
+              <a:blipFill>
+                <a:blip r:embed="rId9"/>
+                <a:stretch>
+                  <a:fillRect t="-389"/>
+                </a:stretch>
+              </a:blipFill>
+            </p:spPr>
+            <p:txBody>
+              <a:bodyPr/>
+              <a:lstStyle/>
+              <a:p>
+                <a:r>
+                  <a:rPr lang="en-US">
+                    <a:noFill/>
+                  </a:rPr>
+                  <a:t> </a:t>
+                </a:r>
+              </a:p>
+            </p:txBody>
+          </p:sp>
+        </mc:Fallback>
+      </mc:AlternateContent>
+      <mc:AlternateContent xmlns:mc="http://schemas.openxmlformats.org/markup-compatibility/2006">
+        <mc:Choice xmlns:a14="http://schemas.microsoft.com/office/drawing/2010/main" Requires="a14">
+          <p:sp>
+            <p:nvSpPr>
+              <p:cNvPr id="13" name="TextBox 12">
+                <a:extLst>
+                  <a:ext uri="{FF2B5EF4-FFF2-40B4-BE49-F238E27FC236}">
+                    <a16:creationId xmlns:a16="http://schemas.microsoft.com/office/drawing/2014/main" id="{DBE895B8-023C-4807-941F-95933F4BD3B7}"/>
+                  </a:ext>
+                </a:extLst>
+              </p:cNvPr>
+              <p:cNvSpPr txBox="1"/>
+              <p:nvPr/>
+            </p:nvSpPr>
+            <p:spPr>
+              <a:xfrm>
+                <a:off x="5042906" y="6233628"/>
+                <a:ext cx="3482192" cy="1569660"/>
+              </a:xfrm>
+              <a:prstGeom prst="rect">
+                <a:avLst/>
+              </a:prstGeom>
+              <a:noFill/>
+            </p:spPr>
+            <p:txBody>
+              <a:bodyPr wrap="square" rtlCol="0">
+                <a:spAutoFit/>
+              </a:bodyPr>
+              <a:lstStyle/>
+              <a:p>
+                <a:r>
+                  <a:rPr lang="en-US" sz="1200" b="1" dirty="0"/>
+                  <a:t>3. </a:t>
+                </a:r>
+                <a:r>
+                  <a:rPr lang="en-US" sz="1200" dirty="0"/>
+                  <a:t>Phobos to Deimos, no stop at DST.  </a:t>
+                </a:r>
+                <a14:m>
+                  <m:oMath xmlns:m="http://schemas.openxmlformats.org/officeDocument/2006/math">
+                    <m:r>
+                      <a:rPr lang="en-US" sz="1200" b="1" i="1">
+                        <a:latin typeface="Cambria Math" panose="02040503050406030204" pitchFamily="18" charset="0"/>
+                      </a:rPr>
+                      <m:t>𝑱</m:t>
+                    </m:r>
+                  </m:oMath>
+                </a14:m>
+                <a:r>
+                  <a:rPr lang="en-US" sz="1200" dirty="0"/>
+                  <a:t> = 15,868</a:t>
+                </a:r>
+              </a:p>
+              <a:p>
+                <a:endParaRPr lang="en-US" sz="1200" dirty="0"/>
+              </a:p>
+              <a:p>
+                <a:r>
+                  <a:rPr lang="el-GR" sz="1200" b="1" dirty="0">
+                    <a:ea typeface="Cambria Math" panose="02040503050406030204" pitchFamily="18" charset="0"/>
+                  </a:rPr>
+                  <a:t>Δ</a:t>
+                </a:r>
+                <a:r>
+                  <a:rPr lang="en-US" sz="1200" b="1" dirty="0">
+                    <a:ea typeface="Cambria Math" panose="02040503050406030204" pitchFamily="18" charset="0"/>
+                  </a:rPr>
+                  <a:t>V</a:t>
+                </a:r>
+                <a:r>
+                  <a:rPr lang="en-US" sz="1200" dirty="0">
+                    <a:ea typeface="Cambria Math" panose="02040503050406030204" pitchFamily="18" charset="0"/>
+                  </a:rPr>
+                  <a:t> = 2.20 km/s</a:t>
+                </a:r>
+              </a:p>
+              <a:p>
+                <a14:m>
+                  <m:oMath xmlns:m="http://schemas.openxmlformats.org/officeDocument/2006/math">
+                    <m:r>
+                      <a:rPr lang="en-US" sz="1200" b="1" i="1">
+                        <a:latin typeface="Cambria Math" panose="02040503050406030204" pitchFamily="18" charset="0"/>
+                        <a:ea typeface="Cambria Math" panose="02040503050406030204" pitchFamily="18" charset="0"/>
+                      </a:rPr>
+                      <m:t>𝒎</m:t>
+                    </m:r>
+                    <m:r>
+                      <a:rPr lang="en-US" sz="1200" b="1" i="1" baseline="-25000">
+                        <a:latin typeface="Cambria Math" panose="02040503050406030204" pitchFamily="18" charset="0"/>
+                        <a:ea typeface="Cambria Math" panose="02040503050406030204" pitchFamily="18" charset="0"/>
+                      </a:rPr>
+                      <m:t>𝑬𝑬𝑽</m:t>
+                    </m:r>
+                  </m:oMath>
+                </a14:m>
+                <a:r>
+                  <a:rPr lang="en-US" sz="1200" dirty="0"/>
+                  <a:t> = 8,854 kg</a:t>
+                </a:r>
+              </a:p>
+              <a:p>
+                <a14:m>
+                  <m:oMath xmlns:m="http://schemas.openxmlformats.org/officeDocument/2006/math">
+                    <m:r>
+                      <a:rPr lang="en-US" sz="1200" b="1" i="1">
+                        <a:latin typeface="Cambria Math" panose="02040503050406030204" pitchFamily="18" charset="0"/>
+                        <a:ea typeface="Cambria Math" panose="02040503050406030204" pitchFamily="18" charset="0"/>
+                      </a:rPr>
+                      <m:t>𝒎</m:t>
+                    </m:r>
+                    <m:r>
+                      <a:rPr lang="en-US" sz="1200" b="1" i="1" baseline="-25000">
+                        <a:latin typeface="Cambria Math" panose="02040503050406030204" pitchFamily="18" charset="0"/>
+                        <a:ea typeface="Cambria Math" panose="02040503050406030204" pitchFamily="18" charset="0"/>
+                      </a:rPr>
+                      <m:t>𝑫𝑺𝑻</m:t>
+                    </m:r>
+                  </m:oMath>
+                </a14:m>
+                <a:r>
+                  <a:rPr lang="en-US" sz="1200" dirty="0"/>
+                  <a:t> = 0 kg</a:t>
+                </a:r>
+              </a:p>
+              <a:p>
+                <a14:m>
+                  <m:oMath xmlns:m="http://schemas.openxmlformats.org/officeDocument/2006/math">
+                    <m:r>
+                      <a:rPr lang="en-US" sz="1200" b="1" i="1">
+                        <a:latin typeface="Cambria Math" panose="02040503050406030204" pitchFamily="18" charset="0"/>
+                        <a:ea typeface="Cambria Math" panose="02040503050406030204" pitchFamily="18" charset="0"/>
+                      </a:rPr>
+                      <m:t>𝒕</m:t>
+                    </m:r>
+                    <m:r>
+                      <a:rPr lang="en-US" sz="1200" b="1" i="1" baseline="-25000">
+                        <a:latin typeface="Cambria Math" panose="02040503050406030204" pitchFamily="18" charset="0"/>
+                        <a:ea typeface="Cambria Math" panose="02040503050406030204" pitchFamily="18" charset="0"/>
+                      </a:rPr>
+                      <m:t>𝑷𝒉𝒐𝒃𝒐𝒔</m:t>
+                    </m:r>
+                  </m:oMath>
+                </a14:m>
+                <a:r>
+                  <a:rPr lang="en-US" sz="1200" dirty="0"/>
+                  <a:t> = 10.52 days</a:t>
+                </a:r>
+              </a:p>
+              <a:p>
+                <a14:m>
+                  <m:oMath xmlns:m="http://schemas.openxmlformats.org/officeDocument/2006/math">
+                    <m:r>
+                      <a:rPr lang="en-US" sz="1200" b="1" i="1">
+                        <a:latin typeface="Cambria Math" panose="02040503050406030204" pitchFamily="18" charset="0"/>
+                        <a:ea typeface="Cambria Math" panose="02040503050406030204" pitchFamily="18" charset="0"/>
+                      </a:rPr>
+                      <m:t>𝒕</m:t>
+                    </m:r>
+                    <m:r>
+                      <a:rPr lang="en-US" sz="1200" b="1" i="1" baseline="-25000">
+                        <a:latin typeface="Cambria Math" panose="02040503050406030204" pitchFamily="18" charset="0"/>
+                        <a:ea typeface="Cambria Math" panose="02040503050406030204" pitchFamily="18" charset="0"/>
+                      </a:rPr>
+                      <m:t>𝑫𝒆𝒊𝒎𝒐𝒔</m:t>
+                    </m:r>
+                  </m:oMath>
+                </a14:m>
+                <a:r>
+                  <a:rPr lang="en-US" sz="1200" dirty="0"/>
+                  <a:t> = 9.35 days</a:t>
+                </a:r>
+              </a:p>
+              <a:p>
+                <a:r>
+                  <a:rPr lang="en-US" sz="1200" b="1" dirty="0"/>
+                  <a:t>					</a:t>
+                </a:r>
+                <a:endParaRPr lang="en-US" sz="1200" dirty="0"/>
+              </a:p>
+            </p:txBody>
+          </p:sp>
+        </mc:Choice>
+        <mc:Fallback>
+          <p:sp>
+            <p:nvSpPr>
+              <p:cNvPr id="13" name="TextBox 12">
+                <a:extLst>
+                  <a:ext uri="{FF2B5EF4-FFF2-40B4-BE49-F238E27FC236}">
+                    <a16:creationId xmlns:a16="http://schemas.microsoft.com/office/drawing/2014/main" id="{DBE895B8-023C-4807-941F-95933F4BD3B7}"/>
+                  </a:ext>
+                </a:extLst>
+              </p:cNvPr>
+              <p:cNvSpPr txBox="1">
+                <a:spLocks noRot="1" noChangeAspect="1" noMove="1" noResize="1" noEditPoints="1" noAdjustHandles="1" noChangeArrowheads="1" noChangeShapeType="1" noTextEdit="1"/>
+              </p:cNvSpPr>
+              <p:nvPr/>
+            </p:nvSpPr>
+            <p:spPr>
+              <a:xfrm>
+                <a:off x="5042906" y="6233628"/>
+                <a:ext cx="3482192" cy="1569660"/>
+              </a:xfrm>
+              <a:prstGeom prst="rect">
+                <a:avLst/>
+              </a:prstGeom>
+              <a:blipFill>
+                <a:blip r:embed="rId10"/>
+                <a:stretch>
+                  <a:fillRect t="-389"/>
+                </a:stretch>
+              </a:blipFill>
+            </p:spPr>
+            <p:txBody>
+              <a:bodyPr/>
+              <a:lstStyle/>
+              <a:p>
+                <a:r>
+                  <a:rPr lang="en-US">
+                    <a:noFill/>
+                  </a:rPr>
+                  <a:t> </a:t>
+                </a:r>
+              </a:p>
+            </p:txBody>
+          </p:sp>
+        </mc:Fallback>
+      </mc:AlternateContent>
+      <mc:AlternateContent xmlns:mc="http://schemas.openxmlformats.org/markup-compatibility/2006">
+        <mc:Choice xmlns:a14="http://schemas.microsoft.com/office/drawing/2010/main" Requires="a14">
+          <p:sp>
+            <p:nvSpPr>
+              <p:cNvPr id="14" name="TextBox 13">
+                <a:extLst>
+                  <a:ext uri="{FF2B5EF4-FFF2-40B4-BE49-F238E27FC236}">
+                    <a16:creationId xmlns:a16="http://schemas.microsoft.com/office/drawing/2014/main" id="{5D3755C3-FC2F-4697-AC37-D72C7945B127}"/>
+                  </a:ext>
+                </a:extLst>
+              </p:cNvPr>
+              <p:cNvSpPr txBox="1"/>
+              <p:nvPr/>
+            </p:nvSpPr>
+            <p:spPr>
+              <a:xfrm>
+                <a:off x="621177" y="7803288"/>
+                <a:ext cx="3482192" cy="1569660"/>
+              </a:xfrm>
+              <a:prstGeom prst="rect">
+                <a:avLst/>
+              </a:prstGeom>
+              <a:noFill/>
+            </p:spPr>
+            <p:txBody>
+              <a:bodyPr wrap="square" rtlCol="0">
+                <a:spAutoFit/>
+              </a:bodyPr>
+              <a:lstStyle/>
+              <a:p>
+                <a:pPr algn="r"/>
+                <a:r>
+                  <a:rPr lang="en-US" sz="1200" b="1" dirty="0"/>
+                  <a:t>4. </a:t>
+                </a:r>
+                <a:r>
+                  <a:rPr lang="en-US" sz="1200" dirty="0"/>
+                  <a:t>Phobos to Deimos, refuel at DST.  </a:t>
+                </a:r>
+                <a14:m>
+                  <m:oMath xmlns:m="http://schemas.openxmlformats.org/officeDocument/2006/math">
+                    <m:r>
+                      <a:rPr lang="en-US" sz="1200" b="1" i="1">
+                        <a:latin typeface="Cambria Math" panose="02040503050406030204" pitchFamily="18" charset="0"/>
+                      </a:rPr>
+                      <m:t>𝑱</m:t>
+                    </m:r>
+                  </m:oMath>
+                </a14:m>
+                <a:r>
+                  <a:rPr lang="en-US" sz="1200" dirty="0"/>
+                  <a:t> = 11,873</a:t>
+                </a:r>
+              </a:p>
+              <a:p>
+                <a:pPr algn="r"/>
+                <a:endParaRPr lang="en-US" sz="1200" dirty="0"/>
+              </a:p>
+              <a:p>
+                <a:pPr algn="r"/>
+                <a:r>
+                  <a:rPr lang="el-GR" sz="1200" b="1" dirty="0">
+                    <a:ea typeface="Cambria Math" panose="02040503050406030204" pitchFamily="18" charset="0"/>
+                  </a:rPr>
+                  <a:t>Δ</a:t>
+                </a:r>
+                <a:r>
+                  <a:rPr lang="en-US" sz="1200" b="1" dirty="0">
+                    <a:ea typeface="Cambria Math" panose="02040503050406030204" pitchFamily="18" charset="0"/>
+                  </a:rPr>
+                  <a:t>V</a:t>
+                </a:r>
+                <a:r>
+                  <a:rPr lang="en-US" sz="1200" dirty="0">
+                    <a:ea typeface="Cambria Math" panose="02040503050406030204" pitchFamily="18" charset="0"/>
+                  </a:rPr>
+                  <a:t> = 1.74 km/s</a:t>
+                </a:r>
+              </a:p>
+              <a:p>
+                <a:pPr algn="r"/>
+                <a14:m>
+                  <m:oMath xmlns:m="http://schemas.openxmlformats.org/officeDocument/2006/math">
+                    <m:r>
+                      <a:rPr lang="en-US" sz="1200" b="1" i="1">
+                        <a:latin typeface="Cambria Math" panose="02040503050406030204" pitchFamily="18" charset="0"/>
+                        <a:ea typeface="Cambria Math" panose="02040503050406030204" pitchFamily="18" charset="0"/>
+                      </a:rPr>
+                      <m:t>𝒎</m:t>
+                    </m:r>
+                    <m:r>
+                      <a:rPr lang="en-US" sz="1200" b="1" i="1" baseline="-25000">
+                        <a:latin typeface="Cambria Math" panose="02040503050406030204" pitchFamily="18" charset="0"/>
+                        <a:ea typeface="Cambria Math" panose="02040503050406030204" pitchFamily="18" charset="0"/>
+                      </a:rPr>
+                      <m:t>𝑬𝑬𝑽</m:t>
+                    </m:r>
+                  </m:oMath>
+                </a14:m>
+                <a:r>
+                  <a:rPr lang="en-US" sz="1200" dirty="0"/>
+                  <a:t> = 6,419 kg</a:t>
+                </a:r>
+              </a:p>
+              <a:p>
+                <a:pPr algn="r"/>
+                <a14:m>
+                  <m:oMath xmlns:m="http://schemas.openxmlformats.org/officeDocument/2006/math">
+                    <m:r>
+                      <a:rPr lang="en-US" sz="1200" b="1" i="1">
+                        <a:latin typeface="Cambria Math" panose="02040503050406030204" pitchFamily="18" charset="0"/>
+                        <a:ea typeface="Cambria Math" panose="02040503050406030204" pitchFamily="18" charset="0"/>
+                      </a:rPr>
+                      <m:t>𝒎</m:t>
+                    </m:r>
+                    <m:r>
+                      <a:rPr lang="en-US" sz="1200" b="1" i="1" baseline="-25000">
+                        <a:latin typeface="Cambria Math" panose="02040503050406030204" pitchFamily="18" charset="0"/>
+                        <a:ea typeface="Cambria Math" panose="02040503050406030204" pitchFamily="18" charset="0"/>
+                      </a:rPr>
+                      <m:t>𝑫𝑺𝑻</m:t>
+                    </m:r>
+                  </m:oMath>
+                </a14:m>
+                <a:r>
+                  <a:rPr lang="en-US" sz="1200" dirty="0"/>
+                  <a:t> = 2851 kg</a:t>
+                </a:r>
+              </a:p>
+              <a:p>
+                <a:pPr algn="r"/>
+                <a14:m>
+                  <m:oMath xmlns:m="http://schemas.openxmlformats.org/officeDocument/2006/math">
+                    <m:r>
+                      <a:rPr lang="en-US" sz="1200" b="1" i="1">
+                        <a:latin typeface="Cambria Math" panose="02040503050406030204" pitchFamily="18" charset="0"/>
+                        <a:ea typeface="Cambria Math" panose="02040503050406030204" pitchFamily="18" charset="0"/>
+                      </a:rPr>
+                      <m:t>𝒕</m:t>
+                    </m:r>
+                    <m:r>
+                      <a:rPr lang="en-US" sz="1200" b="1" i="1" baseline="-25000">
+                        <a:latin typeface="Cambria Math" panose="02040503050406030204" pitchFamily="18" charset="0"/>
+                        <a:ea typeface="Cambria Math" panose="02040503050406030204" pitchFamily="18" charset="0"/>
+                      </a:rPr>
+                      <m:t>𝑷𝒉𝒐𝒃𝒐𝒔</m:t>
+                    </m:r>
+                  </m:oMath>
+                </a14:m>
+                <a:r>
+                  <a:rPr lang="en-US" sz="1200" dirty="0"/>
+                  <a:t> = 9.24 days</a:t>
+                </a:r>
+              </a:p>
+              <a:p>
+                <a:pPr algn="r"/>
+                <a14:m>
+                  <m:oMath xmlns:m="http://schemas.openxmlformats.org/officeDocument/2006/math">
+                    <m:r>
+                      <a:rPr lang="en-US" sz="1200" b="1" i="1">
+                        <a:latin typeface="Cambria Math" panose="02040503050406030204" pitchFamily="18" charset="0"/>
+                        <a:ea typeface="Cambria Math" panose="02040503050406030204" pitchFamily="18" charset="0"/>
+                      </a:rPr>
+                      <m:t>𝒕</m:t>
+                    </m:r>
+                    <m:r>
+                      <a:rPr lang="en-US" sz="1200" b="1" i="1" baseline="-25000">
+                        <a:latin typeface="Cambria Math" panose="02040503050406030204" pitchFamily="18" charset="0"/>
+                        <a:ea typeface="Cambria Math" panose="02040503050406030204" pitchFamily="18" charset="0"/>
+                      </a:rPr>
+                      <m:t>𝑫𝒆𝒊𝒎𝒐𝒔</m:t>
+                    </m:r>
+                  </m:oMath>
+                </a14:m>
+                <a:r>
+                  <a:rPr lang="en-US" sz="1200" dirty="0"/>
+                  <a:t> = 4.91 days</a:t>
+                </a:r>
+              </a:p>
+              <a:p>
+                <a:pPr algn="r"/>
+                <a:r>
+                  <a:rPr lang="en-US" sz="1200" b="1" dirty="0"/>
+                  <a:t>					</a:t>
+                </a:r>
+                <a:endParaRPr lang="en-US" sz="1200" dirty="0"/>
+              </a:p>
+            </p:txBody>
+          </p:sp>
+        </mc:Choice>
+        <mc:Fallback>
+          <p:sp>
+            <p:nvSpPr>
+              <p:cNvPr id="14" name="TextBox 13">
+                <a:extLst>
+                  <a:ext uri="{FF2B5EF4-FFF2-40B4-BE49-F238E27FC236}">
+                    <a16:creationId xmlns:a16="http://schemas.microsoft.com/office/drawing/2014/main" id="{5D3755C3-FC2F-4697-AC37-D72C7945B127}"/>
+                  </a:ext>
+                </a:extLst>
+              </p:cNvPr>
+              <p:cNvSpPr txBox="1">
+                <a:spLocks noRot="1" noChangeAspect="1" noMove="1" noResize="1" noEditPoints="1" noAdjustHandles="1" noChangeArrowheads="1" noChangeShapeType="1" noTextEdit="1"/>
+              </p:cNvSpPr>
+              <p:nvPr/>
+            </p:nvSpPr>
+            <p:spPr>
+              <a:xfrm>
+                <a:off x="621177" y="7803288"/>
+                <a:ext cx="3482192" cy="1569660"/>
+              </a:xfrm>
+              <a:prstGeom prst="rect">
+                <a:avLst/>
+              </a:prstGeom>
+              <a:blipFill>
+                <a:blip r:embed="rId11"/>
+                <a:stretch>
+                  <a:fillRect/>
+                </a:stretch>
+              </a:blipFill>
+            </p:spPr>
+            <p:txBody>
+              <a:bodyPr/>
+              <a:lstStyle/>
+              <a:p>
+                <a:r>
+                  <a:rPr lang="en-US">
+                    <a:noFill/>
+                  </a:rPr>
+                  <a:t> </a:t>
+                </a:r>
+              </a:p>
+            </p:txBody>
+          </p:sp>
+        </mc:Fallback>
+      </mc:AlternateContent>
+    </p:spTree>
+    <p:extLst>
+      <p:ext uri="{BB962C8B-B14F-4D97-AF65-F5344CB8AC3E}">
+        <p14:creationId xmlns:p14="http://schemas.microsoft.com/office/powerpoint/2010/main" val="835957524"/>
       </p:ext>
     </p:extLst>
   </p:cSld>

</xml_diff>

<commit_message>
new payload module config
</commit_message>
<xml_diff>
--- a/foldouts.pptx
+++ b/foldouts.pptx
@@ -245,7 +245,7 @@
           <a:p>
             <a:fld id="{E974B250-0C3F-40FE-9593-256ACF326FB3}" type="datetimeFigureOut">
               <a:rPr lang="en-US" smtClean="0"/>
-              <a:t>4/19/2022</a:t>
+              <a:t>4/20/2022</a:t>
             </a:fld>
             <a:endParaRPr lang="en-US"/>
           </a:p>
@@ -415,7 +415,7 @@
           <a:p>
             <a:fld id="{E974B250-0C3F-40FE-9593-256ACF326FB3}" type="datetimeFigureOut">
               <a:rPr lang="en-US" smtClean="0"/>
-              <a:t>4/19/2022</a:t>
+              <a:t>4/20/2022</a:t>
             </a:fld>
             <a:endParaRPr lang="en-US"/>
           </a:p>
@@ -595,7 +595,7 @@
           <a:p>
             <a:fld id="{E974B250-0C3F-40FE-9593-256ACF326FB3}" type="datetimeFigureOut">
               <a:rPr lang="en-US" smtClean="0"/>
-              <a:t>4/19/2022</a:t>
+              <a:t>4/20/2022</a:t>
             </a:fld>
             <a:endParaRPr lang="en-US"/>
           </a:p>
@@ -765,7 +765,7 @@
           <a:p>
             <a:fld id="{E974B250-0C3F-40FE-9593-256ACF326FB3}" type="datetimeFigureOut">
               <a:rPr lang="en-US" smtClean="0"/>
-              <a:t>4/19/2022</a:t>
+              <a:t>4/20/2022</a:t>
             </a:fld>
             <a:endParaRPr lang="en-US"/>
           </a:p>
@@ -1009,7 +1009,7 @@
           <a:p>
             <a:fld id="{E974B250-0C3F-40FE-9593-256ACF326FB3}" type="datetimeFigureOut">
               <a:rPr lang="en-US" smtClean="0"/>
-              <a:t>4/19/2022</a:t>
+              <a:t>4/20/2022</a:t>
             </a:fld>
             <a:endParaRPr lang="en-US"/>
           </a:p>
@@ -1241,7 +1241,7 @@
           <a:p>
             <a:fld id="{E974B250-0C3F-40FE-9593-256ACF326FB3}" type="datetimeFigureOut">
               <a:rPr lang="en-US" smtClean="0"/>
-              <a:t>4/19/2022</a:t>
+              <a:t>4/20/2022</a:t>
             </a:fld>
             <a:endParaRPr lang="en-US"/>
           </a:p>
@@ -1608,7 +1608,7 @@
           <a:p>
             <a:fld id="{E974B250-0C3F-40FE-9593-256ACF326FB3}" type="datetimeFigureOut">
               <a:rPr lang="en-US" smtClean="0"/>
-              <a:t>4/19/2022</a:t>
+              <a:t>4/20/2022</a:t>
             </a:fld>
             <a:endParaRPr lang="en-US"/>
           </a:p>
@@ -1726,7 +1726,7 @@
           <a:p>
             <a:fld id="{E974B250-0C3F-40FE-9593-256ACF326FB3}" type="datetimeFigureOut">
               <a:rPr lang="en-US" smtClean="0"/>
-              <a:t>4/19/2022</a:t>
+              <a:t>4/20/2022</a:t>
             </a:fld>
             <a:endParaRPr lang="en-US"/>
           </a:p>
@@ -1821,7 +1821,7 @@
           <a:p>
             <a:fld id="{E974B250-0C3F-40FE-9593-256ACF326FB3}" type="datetimeFigureOut">
               <a:rPr lang="en-US" smtClean="0"/>
-              <a:t>4/19/2022</a:t>
+              <a:t>4/20/2022</a:t>
             </a:fld>
             <a:endParaRPr lang="en-US"/>
           </a:p>
@@ -2098,7 +2098,7 @@
           <a:p>
             <a:fld id="{E974B250-0C3F-40FE-9593-256ACF326FB3}" type="datetimeFigureOut">
               <a:rPr lang="en-US" smtClean="0"/>
-              <a:t>4/19/2022</a:t>
+              <a:t>4/20/2022</a:t>
             </a:fld>
             <a:endParaRPr lang="en-US"/>
           </a:p>
@@ -2355,7 +2355,7 @@
           <a:p>
             <a:fld id="{E974B250-0C3F-40FE-9593-256ACF326FB3}" type="datetimeFigureOut">
               <a:rPr lang="en-US" smtClean="0"/>
-              <a:t>4/19/2022</a:t>
+              <a:t>4/20/2022</a:t>
             </a:fld>
             <a:endParaRPr lang="en-US"/>
           </a:p>
@@ -2568,7 +2568,7 @@
           <a:p>
             <a:fld id="{E974B250-0C3F-40FE-9593-256ACF326FB3}" type="datetimeFigureOut">
               <a:rPr lang="en-US" smtClean="0"/>
-              <a:t>4/19/2022</a:t>
+              <a:t>4/20/2022</a:t>
             </a:fld>
             <a:endParaRPr lang="en-US"/>
           </a:p>
@@ -4368,10 +4368,16 @@
                   <a:t>		- </a:t>
                 </a:r>
                 <a:r>
+                  <a:rPr lang="en-US" sz="1600" b="1">
+                    <a:ea typeface="Cambria Math" panose="02040503050406030204" pitchFamily="18" charset="0"/>
+                  </a:rPr>
+                  <a:t>Trajectory #2 </a:t>
+                </a:r>
+                <a:r>
                   <a:rPr lang="en-US" sz="1600" b="1" dirty="0">
                     <a:ea typeface="Cambria Math" panose="02040503050406030204" pitchFamily="18" charset="0"/>
                   </a:rPr>
-                  <a:t>Trajectory #4 was selected for this mission</a:t>
+                  <a:t>was selected for this mission</a:t>
                 </a:r>
               </a:p>
             </p:txBody>
@@ -4422,8 +4428,8 @@
           </p:sp>
         </mc:Fallback>
       </mc:AlternateContent>
-      <mc:AlternateContent xmlns:mc="http://schemas.openxmlformats.org/markup-compatibility/2006">
-        <mc:Choice xmlns:a14="http://schemas.microsoft.com/office/drawing/2010/main" Requires="a14">
+      <mc:AlternateContent xmlns:mc="http://schemas.openxmlformats.org/markup-compatibility/2006" xmlns:a14="http://schemas.microsoft.com/office/drawing/2010/main">
+        <mc:Choice Requires="a14">
           <p:sp>
             <p:nvSpPr>
               <p:cNvPr id="6" name="TextBox 5">
@@ -4559,7 +4565,7 @@
             </p:txBody>
           </p:sp>
         </mc:Choice>
-        <mc:Fallback>
+        <mc:Fallback xmlns="">
           <p:sp>
             <p:nvSpPr>
               <p:cNvPr id="6" name="TextBox 5">
@@ -4604,8 +4610,8 @@
           </p:sp>
         </mc:Fallback>
       </mc:AlternateContent>
-      <mc:AlternateContent xmlns:mc="http://schemas.openxmlformats.org/markup-compatibility/2006">
-        <mc:Choice xmlns:a14="http://schemas.microsoft.com/office/drawing/2010/main" Requires="a14">
+      <mc:AlternateContent xmlns:mc="http://schemas.openxmlformats.org/markup-compatibility/2006" xmlns:a14="http://schemas.microsoft.com/office/drawing/2010/main">
+        <mc:Choice Requires="a14">
           <p:sp>
             <p:nvSpPr>
               <p:cNvPr id="7" name="TextBox 6">
@@ -4786,7 +4792,7 @@
             </p:txBody>
           </p:sp>
         </mc:Choice>
-        <mc:Fallback>
+        <mc:Fallback xmlns="">
           <p:sp>
             <p:nvSpPr>
               <p:cNvPr id="7" name="TextBox 6">
@@ -4831,8 +4837,8 @@
           </p:sp>
         </mc:Fallback>
       </mc:AlternateContent>
-      <mc:AlternateContent xmlns:mc="http://schemas.openxmlformats.org/markup-compatibility/2006">
-        <mc:Choice xmlns:a14="http://schemas.microsoft.com/office/drawing/2010/main" Requires="a14">
+      <mc:AlternateContent xmlns:mc="http://schemas.openxmlformats.org/markup-compatibility/2006" xmlns:a14="http://schemas.microsoft.com/office/drawing/2010/main">
+        <mc:Choice Requires="a14">
           <p:sp>
             <p:nvSpPr>
               <p:cNvPr id="12" name="TextBox 11">
@@ -5021,7 +5027,7 @@
             </p:txBody>
           </p:sp>
         </mc:Choice>
-        <mc:Fallback>
+        <mc:Fallback xmlns="">
           <p:sp>
             <p:nvSpPr>
               <p:cNvPr id="12" name="TextBox 11">
@@ -5066,8 +5072,8 @@
           </p:sp>
         </mc:Fallback>
       </mc:AlternateContent>
-      <mc:AlternateContent xmlns:mc="http://schemas.openxmlformats.org/markup-compatibility/2006">
-        <mc:Choice xmlns:a14="http://schemas.microsoft.com/office/drawing/2010/main" Requires="a14">
+      <mc:AlternateContent xmlns:mc="http://schemas.openxmlformats.org/markup-compatibility/2006" xmlns:a14="http://schemas.microsoft.com/office/drawing/2010/main">
+        <mc:Choice Requires="a14">
           <p:sp>
             <p:nvSpPr>
               <p:cNvPr id="13" name="TextBox 12">
@@ -5248,7 +5254,7 @@
             </p:txBody>
           </p:sp>
         </mc:Choice>
-        <mc:Fallback>
+        <mc:Fallback xmlns="">
           <p:sp>
             <p:nvSpPr>
               <p:cNvPr id="13" name="TextBox 12">
@@ -5293,8 +5299,8 @@
           </p:sp>
         </mc:Fallback>
       </mc:AlternateContent>
-      <mc:AlternateContent xmlns:mc="http://schemas.openxmlformats.org/markup-compatibility/2006">
-        <mc:Choice xmlns:a14="http://schemas.microsoft.com/office/drawing/2010/main" Requires="a14">
+      <mc:AlternateContent xmlns:mc="http://schemas.openxmlformats.org/markup-compatibility/2006" xmlns:a14="http://schemas.microsoft.com/office/drawing/2010/main">
+        <mc:Choice Requires="a14">
           <p:sp>
             <p:nvSpPr>
               <p:cNvPr id="14" name="TextBox 13">
@@ -5483,7 +5489,7 @@
             </p:txBody>
           </p:sp>
         </mc:Choice>
-        <mc:Fallback>
+        <mc:Fallback xmlns="">
           <p:sp>
             <p:nvSpPr>
               <p:cNvPr id="14" name="TextBox 13">

</xml_diff>

<commit_message>
add actuators to solar panels
</commit_message>
<xml_diff>
--- a/foldouts.pptx
+++ b/foldouts.pptx
@@ -245,7 +245,7 @@
           <a:p>
             <a:fld id="{E974B250-0C3F-40FE-9593-256ACF326FB3}" type="datetimeFigureOut">
               <a:rPr lang="en-US" smtClean="0"/>
-              <a:t>4/20/2022</a:t>
+              <a:t>4/21/2022</a:t>
             </a:fld>
             <a:endParaRPr lang="en-US"/>
           </a:p>
@@ -415,7 +415,7 @@
           <a:p>
             <a:fld id="{E974B250-0C3F-40FE-9593-256ACF326FB3}" type="datetimeFigureOut">
               <a:rPr lang="en-US" smtClean="0"/>
-              <a:t>4/20/2022</a:t>
+              <a:t>4/21/2022</a:t>
             </a:fld>
             <a:endParaRPr lang="en-US"/>
           </a:p>
@@ -595,7 +595,7 @@
           <a:p>
             <a:fld id="{E974B250-0C3F-40FE-9593-256ACF326FB3}" type="datetimeFigureOut">
               <a:rPr lang="en-US" smtClean="0"/>
-              <a:t>4/20/2022</a:t>
+              <a:t>4/21/2022</a:t>
             </a:fld>
             <a:endParaRPr lang="en-US"/>
           </a:p>
@@ -765,7 +765,7 @@
           <a:p>
             <a:fld id="{E974B250-0C3F-40FE-9593-256ACF326FB3}" type="datetimeFigureOut">
               <a:rPr lang="en-US" smtClean="0"/>
-              <a:t>4/20/2022</a:t>
+              <a:t>4/21/2022</a:t>
             </a:fld>
             <a:endParaRPr lang="en-US"/>
           </a:p>
@@ -1009,7 +1009,7 @@
           <a:p>
             <a:fld id="{E974B250-0C3F-40FE-9593-256ACF326FB3}" type="datetimeFigureOut">
               <a:rPr lang="en-US" smtClean="0"/>
-              <a:t>4/20/2022</a:t>
+              <a:t>4/21/2022</a:t>
             </a:fld>
             <a:endParaRPr lang="en-US"/>
           </a:p>
@@ -1241,7 +1241,7 @@
           <a:p>
             <a:fld id="{E974B250-0C3F-40FE-9593-256ACF326FB3}" type="datetimeFigureOut">
               <a:rPr lang="en-US" smtClean="0"/>
-              <a:t>4/20/2022</a:t>
+              <a:t>4/21/2022</a:t>
             </a:fld>
             <a:endParaRPr lang="en-US"/>
           </a:p>
@@ -1608,7 +1608,7 @@
           <a:p>
             <a:fld id="{E974B250-0C3F-40FE-9593-256ACF326FB3}" type="datetimeFigureOut">
               <a:rPr lang="en-US" smtClean="0"/>
-              <a:t>4/20/2022</a:t>
+              <a:t>4/21/2022</a:t>
             </a:fld>
             <a:endParaRPr lang="en-US"/>
           </a:p>
@@ -1726,7 +1726,7 @@
           <a:p>
             <a:fld id="{E974B250-0C3F-40FE-9593-256ACF326FB3}" type="datetimeFigureOut">
               <a:rPr lang="en-US" smtClean="0"/>
-              <a:t>4/20/2022</a:t>
+              <a:t>4/21/2022</a:t>
             </a:fld>
             <a:endParaRPr lang="en-US"/>
           </a:p>
@@ -1821,7 +1821,7 @@
           <a:p>
             <a:fld id="{E974B250-0C3F-40FE-9593-256ACF326FB3}" type="datetimeFigureOut">
               <a:rPr lang="en-US" smtClean="0"/>
-              <a:t>4/20/2022</a:t>
+              <a:t>4/21/2022</a:t>
             </a:fld>
             <a:endParaRPr lang="en-US"/>
           </a:p>
@@ -2098,7 +2098,7 @@
           <a:p>
             <a:fld id="{E974B250-0C3F-40FE-9593-256ACF326FB3}" type="datetimeFigureOut">
               <a:rPr lang="en-US" smtClean="0"/>
-              <a:t>4/20/2022</a:t>
+              <a:t>4/21/2022</a:t>
             </a:fld>
             <a:endParaRPr lang="en-US"/>
           </a:p>
@@ -2355,7 +2355,7 @@
           <a:p>
             <a:fld id="{E974B250-0C3F-40FE-9593-256ACF326FB3}" type="datetimeFigureOut">
               <a:rPr lang="en-US" smtClean="0"/>
-              <a:t>4/20/2022</a:t>
+              <a:t>4/21/2022</a:t>
             </a:fld>
             <a:endParaRPr lang="en-US"/>
           </a:p>
@@ -2568,7 +2568,7 @@
           <a:p>
             <a:fld id="{E974B250-0C3F-40FE-9593-256ACF326FB3}" type="datetimeFigureOut">
               <a:rPr lang="en-US" smtClean="0"/>
-              <a:t>4/20/2022</a:t>
+              <a:t>4/21/2022</a:t>
             </a:fld>
             <a:endParaRPr lang="en-US"/>
           </a:p>
@@ -4095,8 +4095,8 @@
           </a:extLst>
         </p:spPr>
       </p:pic>
-      <mc:AlternateContent xmlns:mc="http://schemas.openxmlformats.org/markup-compatibility/2006">
-        <mc:Choice xmlns:a14="http://schemas.microsoft.com/office/drawing/2010/main" Requires="a14">
+      <mc:AlternateContent xmlns:mc="http://schemas.openxmlformats.org/markup-compatibility/2006" xmlns:a14="http://schemas.microsoft.com/office/drawing/2010/main">
+        <mc:Choice Requires="a14">
           <p:sp>
             <p:nvSpPr>
               <p:cNvPr id="4" name="TextBox 3">
@@ -4383,7 +4383,7 @@
             </p:txBody>
           </p:sp>
         </mc:Choice>
-        <mc:Fallback>
+        <mc:Fallback xmlns="">
           <p:sp>
             <p:nvSpPr>
               <p:cNvPr id="4" name="TextBox 3">
@@ -6176,6 +6176,14 @@
 <file path=ppt/slides/slide3.xml><?xml version="1.0" encoding="utf-8"?>
 <p:sld xmlns:a="http://schemas.openxmlformats.org/drawingml/2006/main" xmlns:r="http://schemas.openxmlformats.org/officeDocument/2006/relationships" xmlns:p="http://schemas.openxmlformats.org/presentationml/2006/main">
   <p:cSld>
+    <p:bg>
+      <p:bgPr>
+        <a:solidFill>
+          <a:schemeClr val="bg1"/>
+        </a:solidFill>
+        <a:effectLst/>
+      </p:bgPr>
+    </p:bg>
     <p:spTree>
       <p:nvGrpSpPr>
         <p:cNvPr id="1" name=""/>
@@ -6190,63 +6198,1337 @@
           <a:chExt cx="0" cy="0"/>
         </a:xfrm>
       </p:grpSpPr>
-      <p:sp>
-        <p:nvSpPr>
-          <p:cNvPr id="2" name="Title 1">
+      <p:pic>
+        <p:nvPicPr>
+          <p:cNvPr id="1042" name="Picture 18" descr="See the source image">
             <a:extLst>
               <a:ext uri="{FF2B5EF4-FFF2-40B4-BE49-F238E27FC236}">
-                <a16:creationId xmlns:a16="http://schemas.microsoft.com/office/drawing/2014/main" id="{EAC5DDD8-D924-4F40-B122-68D6B6D1DF75}"/>
+                <a16:creationId xmlns:a16="http://schemas.microsoft.com/office/drawing/2014/main" id="{FD177CAB-5F99-4490-9CB4-85DD9B9C1B20}"/>
               </a:ext>
             </a:extLst>
           </p:cNvPr>
-          <p:cNvSpPr>
-            <a:spLocks noGrp="1"/>
-          </p:cNvSpPr>
-          <p:nvPr>
-            <p:ph type="title"/>
-          </p:nvPr>
+          <p:cNvPicPr>
+            <a:picLocks noChangeAspect="1" noChangeArrowheads="1"/>
+          </p:cNvPicPr>
+          <p:nvPr/>
+        </p:nvPicPr>
+        <p:blipFill rotWithShape="1">
+          <a:blip r:embed="rId2">
+            <a:extLst>
+              <a:ext uri="{28A0092B-C50C-407E-A947-70E740481C1C}">
+                <a14:useLocalDpi xmlns:a14="http://schemas.microsoft.com/office/drawing/2010/main" val="0"/>
+              </a:ext>
+            </a:extLst>
+          </a:blip>
+          <a:srcRect b="10710"/>
+          <a:stretch/>
+        </p:blipFill>
+        <p:spPr bwMode="auto">
+          <a:xfrm>
+            <a:off x="5765036" y="2468378"/>
+            <a:ext cx="1543907" cy="1497435"/>
+          </a:xfrm>
+          <a:prstGeom prst="rect">
+            <a:avLst/>
+          </a:prstGeom>
+          <a:noFill/>
+          <a:extLst>
+            <a:ext uri="{909E8E84-426E-40DD-AFC4-6F175D3DCCD1}">
+              <a14:hiddenFill xmlns:a14="http://schemas.microsoft.com/office/drawing/2010/main">
+                <a:solidFill>
+                  <a:srgbClr val="FFFFFF"/>
+                </a:solidFill>
+              </a14:hiddenFill>
+            </a:ext>
+          </a:extLst>
+        </p:spPr>
+      </p:pic>
+      <p:sp>
+        <p:nvSpPr>
+          <p:cNvPr id="16" name="Arc 15">
+            <a:extLst>
+              <a:ext uri="{FF2B5EF4-FFF2-40B4-BE49-F238E27FC236}">
+                <a16:creationId xmlns:a16="http://schemas.microsoft.com/office/drawing/2014/main" id="{D90E22D6-1C4C-4DBA-8B33-C389D6387842}"/>
+              </a:ext>
+            </a:extLst>
+          </p:cNvPr>
+          <p:cNvSpPr/>
+          <p:nvPr/>
+        </p:nvSpPr>
+        <p:spPr>
+          <a:xfrm flipH="1">
+            <a:off x="12737828" y="0"/>
+            <a:ext cx="2405305" cy="10058400"/>
+          </a:xfrm>
+          <a:prstGeom prst="arc">
+            <a:avLst>
+              <a:gd name="adj1" fmla="val 16200000"/>
+              <a:gd name="adj2" fmla="val 5405093"/>
+            </a:avLst>
+          </a:prstGeom>
+          <a:ln>
+            <a:solidFill>
+              <a:schemeClr val="tx1"/>
+            </a:solidFill>
+            <a:prstDash val="dash"/>
+          </a:ln>
+        </p:spPr>
+        <p:style>
+          <a:lnRef idx="1">
+            <a:schemeClr val="accent1"/>
+          </a:lnRef>
+          <a:fillRef idx="0">
+            <a:schemeClr val="accent1"/>
+          </a:fillRef>
+          <a:effectRef idx="0">
+            <a:schemeClr val="accent1"/>
+          </a:effectRef>
+          <a:fontRef idx="minor">
+            <a:schemeClr val="tx1"/>
+          </a:fontRef>
+        </p:style>
+        <p:txBody>
+          <a:bodyPr rtlCol="0" anchor="ctr"/>
+          <a:lstStyle/>
+          <a:p>
+            <a:pPr algn="ctr"/>
+            <a:endParaRPr lang="en-US"/>
+          </a:p>
+        </p:txBody>
+      </p:sp>
+      <p:sp>
+        <p:nvSpPr>
+          <p:cNvPr id="30" name="Arc 29">
+            <a:extLst>
+              <a:ext uri="{FF2B5EF4-FFF2-40B4-BE49-F238E27FC236}">
+                <a16:creationId xmlns:a16="http://schemas.microsoft.com/office/drawing/2014/main" id="{DC544E0E-7290-44B4-8734-2E079089E9D5}"/>
+              </a:ext>
+            </a:extLst>
+          </p:cNvPr>
+          <p:cNvSpPr/>
+          <p:nvPr/>
+        </p:nvSpPr>
+        <p:spPr>
+          <a:xfrm flipH="1">
+            <a:off x="11174866" y="0"/>
+            <a:ext cx="2405305" cy="10058400"/>
+          </a:xfrm>
+          <a:prstGeom prst="arc">
+            <a:avLst>
+              <a:gd name="adj1" fmla="val 16200000"/>
+              <a:gd name="adj2" fmla="val 5405093"/>
+            </a:avLst>
+          </a:prstGeom>
+          <a:ln>
+            <a:solidFill>
+              <a:schemeClr val="tx1"/>
+            </a:solidFill>
+            <a:prstDash val="dash"/>
+          </a:ln>
+        </p:spPr>
+        <p:style>
+          <a:lnRef idx="1">
+            <a:schemeClr val="accent1"/>
+          </a:lnRef>
+          <a:fillRef idx="0">
+            <a:schemeClr val="accent1"/>
+          </a:fillRef>
+          <a:effectRef idx="0">
+            <a:schemeClr val="accent1"/>
+          </a:effectRef>
+          <a:fontRef idx="minor">
+            <a:schemeClr val="tx1"/>
+          </a:fontRef>
+        </p:style>
+        <p:txBody>
+          <a:bodyPr rtlCol="0" anchor="ctr"/>
+          <a:lstStyle/>
+          <a:p>
+            <a:pPr algn="ctr"/>
+            <a:endParaRPr lang="en-US"/>
+          </a:p>
+        </p:txBody>
+      </p:sp>
+      <p:sp>
+        <p:nvSpPr>
+          <p:cNvPr id="32" name="Arc 31">
+            <a:extLst>
+              <a:ext uri="{FF2B5EF4-FFF2-40B4-BE49-F238E27FC236}">
+                <a16:creationId xmlns:a16="http://schemas.microsoft.com/office/drawing/2014/main" id="{391D4EE4-B4BB-4807-8E4E-A6E8FA788B13}"/>
+              </a:ext>
+            </a:extLst>
+          </p:cNvPr>
+          <p:cNvSpPr/>
+          <p:nvPr/>
+        </p:nvSpPr>
+        <p:spPr>
+          <a:xfrm flipH="1">
+            <a:off x="8541487" y="0"/>
+            <a:ext cx="2405305" cy="10058400"/>
+          </a:xfrm>
+          <a:prstGeom prst="arc">
+            <a:avLst>
+              <a:gd name="adj1" fmla="val 16200000"/>
+              <a:gd name="adj2" fmla="val 5405093"/>
+            </a:avLst>
+          </a:prstGeom>
+          <a:ln>
+            <a:solidFill>
+              <a:schemeClr val="tx1"/>
+            </a:solidFill>
+            <a:prstDash val="dash"/>
+          </a:ln>
+        </p:spPr>
+        <p:style>
+          <a:lnRef idx="1">
+            <a:schemeClr val="accent1"/>
+          </a:lnRef>
+          <a:fillRef idx="0">
+            <a:schemeClr val="accent1"/>
+          </a:fillRef>
+          <a:effectRef idx="0">
+            <a:schemeClr val="accent1"/>
+          </a:effectRef>
+          <a:fontRef idx="minor">
+            <a:schemeClr val="tx1"/>
+          </a:fontRef>
+        </p:style>
+        <p:txBody>
+          <a:bodyPr rtlCol="0" anchor="ctr"/>
+          <a:lstStyle/>
+          <a:p>
+            <a:pPr algn="ctr"/>
+            <a:endParaRPr lang="en-US"/>
+          </a:p>
+        </p:txBody>
+      </p:sp>
+      <p:sp>
+        <p:nvSpPr>
+          <p:cNvPr id="17" name="Oval 16">
+            <a:extLst>
+              <a:ext uri="{FF2B5EF4-FFF2-40B4-BE49-F238E27FC236}">
+                <a16:creationId xmlns:a16="http://schemas.microsoft.com/office/drawing/2014/main" id="{017842C3-D6C5-4582-8D30-37719E6639EB}"/>
+              </a:ext>
+            </a:extLst>
+          </p:cNvPr>
+          <p:cNvSpPr/>
+          <p:nvPr/>
         </p:nvSpPr>
         <p:spPr>
           <a:xfrm>
-            <a:off x="1068705" y="535519"/>
-            <a:ext cx="5294773" cy="901395"/>
+            <a:off x="7898279" y="4617730"/>
+            <a:ext cx="1214437" cy="1128712"/>
           </a:xfrm>
+          <a:prstGeom prst="ellipse">
+            <a:avLst/>
+          </a:prstGeom>
         </p:spPr>
-        <p:txBody>
-          <a:bodyPr>
-            <a:normAutofit/>
+        <p:style>
+          <a:lnRef idx="2">
+            <a:schemeClr val="accent1">
+              <a:shade val="50000"/>
+            </a:schemeClr>
+          </a:lnRef>
+          <a:fillRef idx="1">
+            <a:schemeClr val="accent1"/>
+          </a:fillRef>
+          <a:effectRef idx="0">
+            <a:schemeClr val="accent1"/>
+          </a:effectRef>
+          <a:fontRef idx="minor">
+            <a:schemeClr val="lt1"/>
+          </a:fontRef>
+        </p:style>
+        <p:txBody>
+          <a:bodyPr rtlCol="0" anchor="ctr"/>
+          <a:lstStyle/>
+          <a:p>
+            <a:pPr algn="ctr"/>
+            <a:endParaRPr lang="en-US"/>
+          </a:p>
+        </p:txBody>
+      </p:sp>
+      <p:pic>
+        <p:nvPicPr>
+          <p:cNvPr id="1028" name="Picture 4" descr="See the source image">
+            <a:extLst>
+              <a:ext uri="{FF2B5EF4-FFF2-40B4-BE49-F238E27FC236}">
+                <a16:creationId xmlns:a16="http://schemas.microsoft.com/office/drawing/2014/main" id="{7BD04948-1248-48CD-ABC2-016063185D81}"/>
+              </a:ext>
+            </a:extLst>
+          </p:cNvPr>
+          <p:cNvPicPr>
+            <a:picLocks noChangeAspect="1" noChangeArrowheads="1"/>
+          </p:cNvPicPr>
+          <p:nvPr/>
+        </p:nvPicPr>
+        <p:blipFill>
+          <a:blip r:embed="rId3">
+            <a:extLst>
+              <a:ext uri="{28A0092B-C50C-407E-A947-70E740481C1C}">
+                <a14:useLocalDpi xmlns:a14="http://schemas.microsoft.com/office/drawing/2010/main" val="0"/>
+              </a:ext>
+            </a:extLst>
+          </a:blip>
+          <a:srcRect/>
+          <a:stretch>
+            <a:fillRect/>
+          </a:stretch>
+        </p:blipFill>
+        <p:spPr bwMode="auto">
+          <a:xfrm>
+            <a:off x="4002883" y="10165780"/>
+            <a:ext cx="1529008" cy="1571820"/>
+          </a:xfrm>
+          <a:prstGeom prst="rect">
+            <a:avLst/>
+          </a:prstGeom>
+          <a:noFill/>
+          <a:extLst>
+            <a:ext uri="{909E8E84-426E-40DD-AFC4-6F175D3DCCD1}">
+              <a14:hiddenFill xmlns:a14="http://schemas.microsoft.com/office/drawing/2010/main">
+                <a:solidFill>
+                  <a:srgbClr val="FFFFFF"/>
+                </a:solidFill>
+              </a14:hiddenFill>
+            </a:ext>
+          </a:extLst>
+        </p:spPr>
+      </p:pic>
+      <p:sp>
+        <p:nvSpPr>
+          <p:cNvPr id="43" name="Flowchart: Connector 42">
+            <a:extLst>
+              <a:ext uri="{FF2B5EF4-FFF2-40B4-BE49-F238E27FC236}">
+                <a16:creationId xmlns:a16="http://schemas.microsoft.com/office/drawing/2014/main" id="{69024AB1-6167-4280-B9D5-58D627B3D07F}"/>
+              </a:ext>
+            </a:extLst>
+          </p:cNvPr>
+          <p:cNvSpPr/>
+          <p:nvPr/>
+        </p:nvSpPr>
+        <p:spPr>
+          <a:xfrm>
+            <a:off x="13929254" y="6951867"/>
+            <a:ext cx="805433" cy="780901"/>
+          </a:xfrm>
+          <a:prstGeom prst="flowChartConnector">
+            <a:avLst/>
+          </a:prstGeom>
+          <a:solidFill>
+            <a:schemeClr val="bg2"/>
+          </a:solidFill>
+          <a:ln>
+            <a:solidFill>
+              <a:schemeClr val="tx1"/>
+            </a:solidFill>
+          </a:ln>
+        </p:spPr>
+        <p:style>
+          <a:lnRef idx="2">
+            <a:schemeClr val="accent1">
+              <a:shade val="50000"/>
+            </a:schemeClr>
+          </a:lnRef>
+          <a:fillRef idx="1">
+            <a:schemeClr val="accent1"/>
+          </a:fillRef>
+          <a:effectRef idx="0">
+            <a:schemeClr val="accent1"/>
+          </a:effectRef>
+          <a:fontRef idx="minor">
+            <a:schemeClr val="lt1"/>
+          </a:fontRef>
+        </p:style>
+        <p:txBody>
+          <a:bodyPr rtlCol="0" anchor="ctr"/>
+          <a:lstStyle/>
+          <a:p>
+            <a:pPr algn="ctr"/>
+            <a:r>
+              <a:rPr lang="en-US" sz="3200" dirty="0">
+                <a:solidFill>
+                  <a:schemeClr val="tx1"/>
+                </a:solidFill>
+                <a:latin typeface="Arial Rounded MT Bold" panose="020F0704030504030204" pitchFamily="34" charset="0"/>
+              </a:rPr>
+              <a:t>2</a:t>
+            </a:r>
+          </a:p>
+        </p:txBody>
+      </p:sp>
+      <p:pic>
+        <p:nvPicPr>
+          <p:cNvPr id="1026" name="Picture 2" descr="See the source image">
+            <a:extLst>
+              <a:ext uri="{FF2B5EF4-FFF2-40B4-BE49-F238E27FC236}">
+                <a16:creationId xmlns:a16="http://schemas.microsoft.com/office/drawing/2014/main" id="{26E3F656-DC77-4CDA-AFFA-DEB39D75E0EA}"/>
+              </a:ext>
+            </a:extLst>
+          </p:cNvPr>
+          <p:cNvPicPr>
+            <a:picLocks noChangeAspect="1" noChangeArrowheads="1"/>
+          </p:cNvPicPr>
+          <p:nvPr/>
+        </p:nvPicPr>
+        <p:blipFill>
+          <a:blip r:embed="rId4">
+            <a:extLst>
+              <a:ext uri="{28A0092B-C50C-407E-A947-70E740481C1C}">
+                <a14:useLocalDpi xmlns:a14="http://schemas.microsoft.com/office/drawing/2010/main" val="0"/>
+              </a:ext>
+            </a:extLst>
+          </a:blip>
+          <a:srcRect/>
+          <a:stretch>
+            <a:fillRect/>
+          </a:stretch>
+        </p:blipFill>
+        <p:spPr bwMode="auto">
+          <a:xfrm>
+            <a:off x="5721590" y="10327090"/>
+            <a:ext cx="1466197" cy="1249200"/>
+          </a:xfrm>
+          <a:prstGeom prst="rect">
+            <a:avLst/>
+          </a:prstGeom>
+          <a:noFill/>
+          <a:extLst>
+            <a:ext uri="{909E8E84-426E-40DD-AFC4-6F175D3DCCD1}">
+              <a14:hiddenFill xmlns:a14="http://schemas.microsoft.com/office/drawing/2010/main">
+                <a:solidFill>
+                  <a:srgbClr val="FFFFFF"/>
+                </a:solidFill>
+              </a14:hiddenFill>
+            </a:ext>
+          </a:extLst>
+        </p:spPr>
+      </p:pic>
+      <p:pic>
+        <p:nvPicPr>
+          <p:cNvPr id="31" name="Picture 30">
+            <a:extLst>
+              <a:ext uri="{FF2B5EF4-FFF2-40B4-BE49-F238E27FC236}">
+                <a16:creationId xmlns:a16="http://schemas.microsoft.com/office/drawing/2014/main" id="{AB08CBB7-B56A-40DD-BC3C-EAF3D4A985CA}"/>
+              </a:ext>
+            </a:extLst>
+          </p:cNvPr>
+          <p:cNvPicPr>
+            <a:picLocks noChangeAspect="1"/>
+          </p:cNvPicPr>
+          <p:nvPr/>
+        </p:nvPicPr>
+        <p:blipFill rotWithShape="1">
+          <a:blip r:embed="rId5">
+            <a:extLst>
+              <a:ext uri="{28A0092B-C50C-407E-A947-70E740481C1C}">
+                <a14:useLocalDpi xmlns:a14="http://schemas.microsoft.com/office/drawing/2010/main" val="0"/>
+              </a:ext>
+            </a:extLst>
+          </a:blip>
+          <a:srcRect l="28985" t="20305" r="32221" b="19067"/>
+          <a:stretch/>
+        </p:blipFill>
+        <p:spPr>
+          <a:xfrm>
+            <a:off x="10284053" y="2069620"/>
+            <a:ext cx="2339738" cy="1800301"/>
+          </a:xfrm>
+          <a:prstGeom prst="rect">
+            <a:avLst/>
+          </a:prstGeom>
+        </p:spPr>
+      </p:pic>
+      <p:sp>
+        <p:nvSpPr>
+          <p:cNvPr id="47" name="Arc 46">
+            <a:extLst>
+              <a:ext uri="{FF2B5EF4-FFF2-40B4-BE49-F238E27FC236}">
+                <a16:creationId xmlns:a16="http://schemas.microsoft.com/office/drawing/2014/main" id="{9F94A80A-0562-4C2C-BED5-94901FBC9112}"/>
+              </a:ext>
+            </a:extLst>
+          </p:cNvPr>
+          <p:cNvSpPr/>
+          <p:nvPr/>
+        </p:nvSpPr>
+        <p:spPr>
+          <a:xfrm flipH="1" flipV="1">
+            <a:off x="7097894" y="2240042"/>
+            <a:ext cx="4076971" cy="2714714"/>
+          </a:xfrm>
+          <a:prstGeom prst="arc">
+            <a:avLst>
+              <a:gd name="adj1" fmla="val 11157885"/>
+              <a:gd name="adj2" fmla="val 16191022"/>
+            </a:avLst>
+          </a:prstGeom>
+          <a:ln w="25400">
+            <a:solidFill>
+              <a:schemeClr val="accent1">
+                <a:lumMod val="50000"/>
+              </a:schemeClr>
+            </a:solidFill>
+            <a:headEnd type="arrow"/>
+          </a:ln>
+        </p:spPr>
+        <p:style>
+          <a:lnRef idx="1">
+            <a:schemeClr val="accent1"/>
+          </a:lnRef>
+          <a:fillRef idx="0">
+            <a:schemeClr val="accent1"/>
+          </a:fillRef>
+          <a:effectRef idx="0">
+            <a:schemeClr val="accent1"/>
+          </a:effectRef>
+          <a:fontRef idx="minor">
+            <a:schemeClr val="tx1"/>
+          </a:fontRef>
+        </p:style>
+        <p:txBody>
+          <a:bodyPr rtlCol="0" anchor="ctr"/>
+          <a:lstStyle/>
+          <a:p>
+            <a:pPr algn="ctr"/>
+            <a:endParaRPr lang="en-US"/>
+          </a:p>
+        </p:txBody>
+      </p:sp>
+      <p:sp>
+        <p:nvSpPr>
+          <p:cNvPr id="46" name="Flowchart: Connector 45">
+            <a:extLst>
+              <a:ext uri="{FF2B5EF4-FFF2-40B4-BE49-F238E27FC236}">
+                <a16:creationId xmlns:a16="http://schemas.microsoft.com/office/drawing/2014/main" id="{20642FE9-C4E4-48EF-B651-F3E9A7FC4D19}"/>
+              </a:ext>
+            </a:extLst>
+          </p:cNvPr>
+          <p:cNvSpPr/>
+          <p:nvPr/>
+        </p:nvSpPr>
+        <p:spPr>
+          <a:xfrm>
+            <a:off x="9898102" y="4245178"/>
+            <a:ext cx="805433" cy="780901"/>
+          </a:xfrm>
+          <a:prstGeom prst="flowChartConnector">
+            <a:avLst/>
+          </a:prstGeom>
+          <a:solidFill>
+            <a:schemeClr val="bg2"/>
+          </a:solidFill>
+          <a:ln>
+            <a:solidFill>
+              <a:schemeClr val="tx1"/>
+            </a:solidFill>
+          </a:ln>
+        </p:spPr>
+        <p:style>
+          <a:lnRef idx="2">
+            <a:schemeClr val="accent1">
+              <a:shade val="50000"/>
+            </a:schemeClr>
+          </a:lnRef>
+          <a:fillRef idx="1">
+            <a:schemeClr val="accent1"/>
+          </a:fillRef>
+          <a:effectRef idx="0">
+            <a:schemeClr val="accent1"/>
+          </a:effectRef>
+          <a:fontRef idx="minor">
+            <a:schemeClr val="lt1"/>
+          </a:fontRef>
+        </p:style>
+        <p:txBody>
+          <a:bodyPr rtlCol="0" anchor="ctr"/>
+          <a:lstStyle/>
+          <a:p>
+            <a:pPr algn="ctr"/>
+            <a:r>
+              <a:rPr lang="en-US" sz="3200" dirty="0">
+                <a:solidFill>
+                  <a:schemeClr val="tx1"/>
+                </a:solidFill>
+                <a:latin typeface="Arial Rounded MT Bold" panose="020F0704030504030204" pitchFamily="34" charset="0"/>
+              </a:rPr>
+              <a:t>4</a:t>
+            </a:r>
+          </a:p>
+        </p:txBody>
+      </p:sp>
+      <p:sp>
+        <p:nvSpPr>
+          <p:cNvPr id="48" name="Arc 47">
+            <a:extLst>
+              <a:ext uri="{FF2B5EF4-FFF2-40B4-BE49-F238E27FC236}">
+                <a16:creationId xmlns:a16="http://schemas.microsoft.com/office/drawing/2014/main" id="{2920A2B9-DD1A-41BD-91FF-80B1B4C874FD}"/>
+              </a:ext>
+            </a:extLst>
+          </p:cNvPr>
+          <p:cNvSpPr/>
+          <p:nvPr/>
+        </p:nvSpPr>
+        <p:spPr>
+          <a:xfrm>
+            <a:off x="8637531" y="2905522"/>
+            <a:ext cx="3572225" cy="3696764"/>
+          </a:xfrm>
+          <a:prstGeom prst="arc">
+            <a:avLst>
+              <a:gd name="adj1" fmla="val 11157885"/>
+              <a:gd name="adj2" fmla="val 16191022"/>
+            </a:avLst>
+          </a:prstGeom>
+          <a:ln w="25400">
+            <a:solidFill>
+              <a:schemeClr val="accent1">
+                <a:lumMod val="50000"/>
+              </a:schemeClr>
+            </a:solidFill>
+            <a:headEnd type="arrow"/>
+          </a:ln>
+        </p:spPr>
+        <p:style>
+          <a:lnRef idx="1">
+            <a:schemeClr val="accent1"/>
+          </a:lnRef>
+          <a:fillRef idx="0">
+            <a:schemeClr val="accent1"/>
+          </a:fillRef>
+          <a:effectRef idx="0">
+            <a:schemeClr val="accent1"/>
+          </a:effectRef>
+          <a:fontRef idx="minor">
+            <a:schemeClr val="tx1"/>
+          </a:fontRef>
+        </p:style>
+        <p:txBody>
+          <a:bodyPr rtlCol="0" anchor="ctr"/>
+          <a:lstStyle/>
+          <a:p>
+            <a:pPr algn="ctr"/>
+            <a:endParaRPr lang="en-US"/>
+          </a:p>
+        </p:txBody>
+      </p:sp>
+      <p:sp>
+        <p:nvSpPr>
+          <p:cNvPr id="50" name="Flowchart: Connector 49">
+            <a:extLst>
+              <a:ext uri="{FF2B5EF4-FFF2-40B4-BE49-F238E27FC236}">
+                <a16:creationId xmlns:a16="http://schemas.microsoft.com/office/drawing/2014/main" id="{B8A8ACB7-7CF4-40BB-8053-97FDC338FA62}"/>
+              </a:ext>
+            </a:extLst>
+          </p:cNvPr>
+          <p:cNvSpPr/>
+          <p:nvPr/>
+        </p:nvSpPr>
+        <p:spPr>
+          <a:xfrm>
+            <a:off x="9010054" y="2925102"/>
+            <a:ext cx="805433" cy="780901"/>
+          </a:xfrm>
+          <a:prstGeom prst="flowChartConnector">
+            <a:avLst/>
+          </a:prstGeom>
+          <a:solidFill>
+            <a:schemeClr val="bg2"/>
+          </a:solidFill>
+          <a:ln>
+            <a:solidFill>
+              <a:schemeClr val="tx1"/>
+            </a:solidFill>
+          </a:ln>
+        </p:spPr>
+        <p:style>
+          <a:lnRef idx="2">
+            <a:schemeClr val="accent1">
+              <a:shade val="50000"/>
+            </a:schemeClr>
+          </a:lnRef>
+          <a:fillRef idx="1">
+            <a:schemeClr val="accent1"/>
+          </a:fillRef>
+          <a:effectRef idx="0">
+            <a:schemeClr val="accent1"/>
+          </a:effectRef>
+          <a:fontRef idx="minor">
+            <a:schemeClr val="lt1"/>
+          </a:fontRef>
+        </p:style>
+        <p:txBody>
+          <a:bodyPr rtlCol="0" anchor="ctr"/>
+          <a:lstStyle/>
+          <a:p>
+            <a:pPr algn="ctr"/>
+            <a:r>
+              <a:rPr lang="en-US" sz="3200" dirty="0">
+                <a:solidFill>
+                  <a:schemeClr val="tx1"/>
+                </a:solidFill>
+                <a:latin typeface="Arial Rounded MT Bold" panose="020F0704030504030204" pitchFamily="34" charset="0"/>
+              </a:rPr>
+              <a:t>6</a:t>
+            </a:r>
+          </a:p>
+        </p:txBody>
+      </p:sp>
+      <p:sp>
+        <p:nvSpPr>
+          <p:cNvPr id="34" name="Arc 33">
+            <a:extLst>
+              <a:ext uri="{FF2B5EF4-FFF2-40B4-BE49-F238E27FC236}">
+                <a16:creationId xmlns:a16="http://schemas.microsoft.com/office/drawing/2014/main" id="{EFA69866-04E6-47FC-9DCB-8F95DE7277BD}"/>
+              </a:ext>
+            </a:extLst>
+          </p:cNvPr>
+          <p:cNvSpPr/>
+          <p:nvPr/>
+        </p:nvSpPr>
+        <p:spPr>
+          <a:xfrm>
+            <a:off x="5559025" y="5103644"/>
+            <a:ext cx="7024171" cy="2420355"/>
+          </a:xfrm>
+          <a:prstGeom prst="arc">
+            <a:avLst>
+              <a:gd name="adj1" fmla="val 16268878"/>
+              <a:gd name="adj2" fmla="val 21169555"/>
+            </a:avLst>
+          </a:prstGeom>
+          <a:ln w="25400">
+            <a:solidFill>
+              <a:schemeClr val="accent1">
+                <a:lumMod val="50000"/>
+              </a:schemeClr>
+            </a:solidFill>
+            <a:headEnd type="arrow"/>
+          </a:ln>
+        </p:spPr>
+        <p:style>
+          <a:lnRef idx="1">
+            <a:schemeClr val="accent1"/>
+          </a:lnRef>
+          <a:fillRef idx="0">
+            <a:schemeClr val="accent1"/>
+          </a:fillRef>
+          <a:effectRef idx="0">
+            <a:schemeClr val="accent1"/>
+          </a:effectRef>
+          <a:fontRef idx="minor">
+            <a:schemeClr val="tx1"/>
+          </a:fontRef>
+        </p:style>
+        <p:txBody>
+          <a:bodyPr rtlCol="0" anchor="ctr"/>
+          <a:lstStyle/>
+          <a:p>
+            <a:pPr algn="ctr"/>
+            <a:endParaRPr lang="en-US" dirty="0"/>
+          </a:p>
+        </p:txBody>
+      </p:sp>
+      <p:sp>
+        <p:nvSpPr>
+          <p:cNvPr id="44" name="Flowchart: Connector 43">
+            <a:extLst>
+              <a:ext uri="{FF2B5EF4-FFF2-40B4-BE49-F238E27FC236}">
+                <a16:creationId xmlns:a16="http://schemas.microsoft.com/office/drawing/2014/main" id="{BB34581A-2031-4336-B0D8-1817AB9A5796}"/>
+              </a:ext>
+            </a:extLst>
+          </p:cNvPr>
+          <p:cNvSpPr/>
+          <p:nvPr/>
+        </p:nvSpPr>
+        <p:spPr>
+          <a:xfrm>
+            <a:off x="11338695" y="5120690"/>
+            <a:ext cx="805433" cy="780901"/>
+          </a:xfrm>
+          <a:prstGeom prst="flowChartConnector">
+            <a:avLst/>
+          </a:prstGeom>
+          <a:solidFill>
+            <a:schemeClr val="bg2"/>
+          </a:solidFill>
+          <a:ln>
+            <a:solidFill>
+              <a:schemeClr val="tx1"/>
+            </a:solidFill>
+          </a:ln>
+        </p:spPr>
+        <p:style>
+          <a:lnRef idx="2">
+            <a:schemeClr val="accent1">
+              <a:shade val="50000"/>
+            </a:schemeClr>
+          </a:lnRef>
+          <a:fillRef idx="1">
+            <a:schemeClr val="accent1"/>
+          </a:fillRef>
+          <a:effectRef idx="0">
+            <a:schemeClr val="accent1"/>
+          </a:effectRef>
+          <a:fontRef idx="minor">
+            <a:schemeClr val="lt1"/>
+          </a:fontRef>
+        </p:style>
+        <p:txBody>
+          <a:bodyPr rtlCol="0" anchor="ctr"/>
+          <a:lstStyle/>
+          <a:p>
+            <a:pPr algn="ctr"/>
+            <a:r>
+              <a:rPr lang="en-US" sz="3200" dirty="0">
+                <a:solidFill>
+                  <a:schemeClr val="tx1"/>
+                </a:solidFill>
+                <a:latin typeface="Arial Rounded MT Bold" panose="020F0704030504030204" pitchFamily="34" charset="0"/>
+              </a:rPr>
+              <a:t>3</a:t>
+            </a:r>
+          </a:p>
+        </p:txBody>
+      </p:sp>
+      <p:sp>
+        <p:nvSpPr>
+          <p:cNvPr id="49" name="Flowchart: Connector 48">
+            <a:extLst>
+              <a:ext uri="{FF2B5EF4-FFF2-40B4-BE49-F238E27FC236}">
+                <a16:creationId xmlns:a16="http://schemas.microsoft.com/office/drawing/2014/main" id="{0D7C00D1-D0BE-44D0-9715-9CFFC3B7EB74}"/>
+              </a:ext>
+            </a:extLst>
+          </p:cNvPr>
+          <p:cNvSpPr/>
+          <p:nvPr/>
+        </p:nvSpPr>
+        <p:spPr>
+          <a:xfrm>
+            <a:off x="11982188" y="1363045"/>
+            <a:ext cx="805433" cy="780901"/>
+          </a:xfrm>
+          <a:prstGeom prst="flowChartConnector">
+            <a:avLst/>
+          </a:prstGeom>
+          <a:solidFill>
+            <a:schemeClr val="bg2"/>
+          </a:solidFill>
+          <a:ln>
+            <a:solidFill>
+              <a:schemeClr val="tx1"/>
+            </a:solidFill>
+          </a:ln>
+        </p:spPr>
+        <p:style>
+          <a:lnRef idx="2">
+            <a:schemeClr val="accent1">
+              <a:shade val="50000"/>
+            </a:schemeClr>
+          </a:lnRef>
+          <a:fillRef idx="1">
+            <a:schemeClr val="accent1"/>
+          </a:fillRef>
+          <a:effectRef idx="0">
+            <a:schemeClr val="accent1"/>
+          </a:effectRef>
+          <a:fontRef idx="minor">
+            <a:schemeClr val="lt1"/>
+          </a:fontRef>
+        </p:style>
+        <p:txBody>
+          <a:bodyPr rtlCol="0" anchor="ctr"/>
+          <a:lstStyle/>
+          <a:p>
+            <a:pPr algn="ctr"/>
+            <a:r>
+              <a:rPr lang="en-US" sz="3200" dirty="0">
+                <a:solidFill>
+                  <a:schemeClr val="tx1"/>
+                </a:solidFill>
+                <a:latin typeface="Arial Rounded MT Bold" panose="020F0704030504030204" pitchFamily="34" charset="0"/>
+              </a:rPr>
+              <a:t>5</a:t>
+            </a:r>
+          </a:p>
+        </p:txBody>
+      </p:sp>
+      <p:pic>
+        <p:nvPicPr>
+          <p:cNvPr id="1044" name="Picture 20" descr="See the source image">
+            <a:extLst>
+              <a:ext uri="{FF2B5EF4-FFF2-40B4-BE49-F238E27FC236}">
+                <a16:creationId xmlns:a16="http://schemas.microsoft.com/office/drawing/2014/main" id="{BD41071C-508A-4542-B35D-ABB8C4EF2574}"/>
+              </a:ext>
+            </a:extLst>
+          </p:cNvPr>
+          <p:cNvPicPr>
+            <a:picLocks noChangeAspect="1" noChangeArrowheads="1"/>
+          </p:cNvPicPr>
+          <p:nvPr/>
+        </p:nvPicPr>
+        <p:blipFill rotWithShape="1">
+          <a:blip r:embed="rId6">
+            <a:extLst>
+              <a:ext uri="{28A0092B-C50C-407E-A947-70E740481C1C}">
+                <a14:useLocalDpi xmlns:a14="http://schemas.microsoft.com/office/drawing/2010/main" val="0"/>
+              </a:ext>
+            </a:extLst>
+          </a:blip>
+          <a:srcRect r="63308"/>
+          <a:stretch/>
+        </p:blipFill>
+        <p:spPr bwMode="auto">
+          <a:xfrm>
+            <a:off x="13304374" y="1725169"/>
+            <a:ext cx="2240426" cy="6106032"/>
+          </a:xfrm>
+          <a:prstGeom prst="rect">
+            <a:avLst/>
+          </a:prstGeom>
+          <a:noFill/>
+          <a:extLst>
+            <a:ext uri="{909E8E84-426E-40DD-AFC4-6F175D3DCCD1}">
+              <a14:hiddenFill xmlns:a14="http://schemas.microsoft.com/office/drawing/2010/main">
+                <a:solidFill>
+                  <a:srgbClr val="FFFFFF"/>
+                </a:solidFill>
+              </a14:hiddenFill>
+            </a:ext>
+          </a:extLst>
+        </p:spPr>
+      </p:pic>
+      <p:pic>
+        <p:nvPicPr>
+          <p:cNvPr id="28" name="Picture 27">
+            <a:extLst>
+              <a:ext uri="{FF2B5EF4-FFF2-40B4-BE49-F238E27FC236}">
+                <a16:creationId xmlns:a16="http://schemas.microsoft.com/office/drawing/2014/main" id="{15097410-DA20-4D63-9BC7-7E88BC7B6692}"/>
+              </a:ext>
+            </a:extLst>
+          </p:cNvPr>
+          <p:cNvPicPr>
+            <a:picLocks noChangeAspect="1"/>
+          </p:cNvPicPr>
+          <p:nvPr/>
+        </p:nvPicPr>
+        <p:blipFill rotWithShape="1">
+          <a:blip r:embed="rId7">
+            <a:extLst>
+              <a:ext uri="{28A0092B-C50C-407E-A947-70E740481C1C}">
+                <a14:useLocalDpi xmlns:a14="http://schemas.microsoft.com/office/drawing/2010/main" val="0"/>
+              </a:ext>
+            </a:extLst>
+          </a:blip>
+          <a:srcRect l="31737" t="21327" r="31198" b="19192"/>
+          <a:stretch/>
+        </p:blipFill>
+        <p:spPr>
+          <a:xfrm>
+            <a:off x="11410906" y="5929091"/>
+            <a:ext cx="2374896" cy="1876376"/>
+          </a:xfrm>
+          <a:prstGeom prst="rect">
+            <a:avLst/>
+          </a:prstGeom>
+        </p:spPr>
+      </p:pic>
+      <p:sp>
+        <p:nvSpPr>
+          <p:cNvPr id="55" name="Flowchart: Connector 54">
+            <a:extLst>
+              <a:ext uri="{FF2B5EF4-FFF2-40B4-BE49-F238E27FC236}">
+                <a16:creationId xmlns:a16="http://schemas.microsoft.com/office/drawing/2014/main" id="{8E193763-F6C6-409C-A363-868FC306A788}"/>
+              </a:ext>
+            </a:extLst>
+          </p:cNvPr>
+          <p:cNvSpPr/>
+          <p:nvPr/>
+        </p:nvSpPr>
+        <p:spPr>
+          <a:xfrm>
+            <a:off x="13781586" y="6951867"/>
+            <a:ext cx="805433" cy="780901"/>
+          </a:xfrm>
+          <a:prstGeom prst="flowChartConnector">
+            <a:avLst/>
+          </a:prstGeom>
+          <a:solidFill>
+            <a:schemeClr val="bg2"/>
+          </a:solidFill>
+          <a:ln>
+            <a:solidFill>
+              <a:schemeClr val="tx1"/>
+            </a:solidFill>
+          </a:ln>
+        </p:spPr>
+        <p:style>
+          <a:lnRef idx="2">
+            <a:schemeClr val="accent1">
+              <a:shade val="50000"/>
+            </a:schemeClr>
+          </a:lnRef>
+          <a:fillRef idx="1">
+            <a:schemeClr val="accent1"/>
+          </a:fillRef>
+          <a:effectRef idx="0">
+            <a:schemeClr val="accent1"/>
+          </a:effectRef>
+          <a:fontRef idx="minor">
+            <a:schemeClr val="lt1"/>
+          </a:fontRef>
+        </p:style>
+        <p:txBody>
+          <a:bodyPr rtlCol="0" anchor="ctr"/>
+          <a:lstStyle/>
+          <a:p>
+            <a:pPr algn="ctr"/>
+            <a:r>
+              <a:rPr lang="en-US" sz="3200" dirty="0">
+                <a:solidFill>
+                  <a:schemeClr val="tx1"/>
+                </a:solidFill>
+                <a:latin typeface="Arial Rounded MT Bold" panose="020F0704030504030204" pitchFamily="34" charset="0"/>
+              </a:rPr>
+              <a:t>2</a:t>
+            </a:r>
+          </a:p>
+        </p:txBody>
+      </p:sp>
+      <p:sp>
+        <p:nvSpPr>
+          <p:cNvPr id="33" name="TextBox 32">
+            <a:extLst>
+              <a:ext uri="{FF2B5EF4-FFF2-40B4-BE49-F238E27FC236}">
+                <a16:creationId xmlns:a16="http://schemas.microsoft.com/office/drawing/2014/main" id="{FED37A30-5032-4A86-B664-E7D481F4C5CD}"/>
+              </a:ext>
+            </a:extLst>
+          </p:cNvPr>
+          <p:cNvSpPr txBox="1"/>
+          <p:nvPr/>
+        </p:nvSpPr>
+        <p:spPr>
+          <a:xfrm>
+            <a:off x="8907798" y="1467115"/>
+            <a:ext cx="2638474" cy="692497"/>
+          </a:xfrm>
+          <a:prstGeom prst="rect">
+            <a:avLst/>
+          </a:prstGeom>
+          <a:noFill/>
+        </p:spPr>
+        <p:txBody>
+          <a:bodyPr wrap="square" rtlCol="0">
+            <a:spAutoFit/>
           </a:bodyPr>
           <a:lstStyle/>
           <a:p>
             <a:r>
-              <a:rPr lang="en-US" sz="2400" dirty="0"/>
-              <a:t>Concept of Operations</a:t>
-            </a:r>
-          </a:p>
-        </p:txBody>
-      </p:sp>
-      <p:sp>
-        <p:nvSpPr>
-          <p:cNvPr id="3" name="Content Placeholder 2">
+              <a:rPr lang="en-US" sz="1300" b="1" dirty="0"/>
+              <a:t>Landing Sites:</a:t>
+            </a:r>
+          </a:p>
+          <a:p>
+            <a:r>
+              <a:rPr lang="en-US" sz="1300" dirty="0"/>
+              <a:t>1) Swift Crafter (12.5</a:t>
+            </a:r>
+            <a:r>
+              <a:rPr lang="en-US" sz="1300" baseline="30000" dirty="0"/>
+              <a:t>o </a:t>
+            </a:r>
+            <a:r>
+              <a:rPr lang="en-US" sz="1300" dirty="0"/>
+              <a:t>N 1.8</a:t>
+            </a:r>
+            <a:r>
+              <a:rPr lang="en-US" sz="1300" baseline="30000" dirty="0"/>
+              <a:t>o </a:t>
+            </a:r>
+            <a:r>
+              <a:rPr lang="en-US" sz="1300" dirty="0"/>
+              <a:t>E)</a:t>
+            </a:r>
+          </a:p>
+          <a:p>
+            <a:r>
+              <a:rPr lang="en-US" sz="1300" dirty="0"/>
+              <a:t>2) Voltaire Crater (22.0</a:t>
+            </a:r>
+            <a:r>
+              <a:rPr lang="en-US" sz="1300" baseline="30000" dirty="0"/>
+              <a:t>o </a:t>
+            </a:r>
+            <a:r>
+              <a:rPr lang="en-US" sz="1300" dirty="0"/>
+              <a:t>N 3.5</a:t>
+            </a:r>
+            <a:r>
+              <a:rPr lang="en-US" sz="1300" baseline="30000" dirty="0"/>
+              <a:t>o </a:t>
+            </a:r>
+            <a:r>
+              <a:rPr lang="en-US" sz="1300" dirty="0"/>
+              <a:t>W)</a:t>
+            </a:r>
+          </a:p>
+        </p:txBody>
+      </p:sp>
+      <p:sp>
+        <p:nvSpPr>
+          <p:cNvPr id="59" name="TextBox 58">
             <a:extLst>
               <a:ext uri="{FF2B5EF4-FFF2-40B4-BE49-F238E27FC236}">
-                <a16:creationId xmlns:a16="http://schemas.microsoft.com/office/drawing/2014/main" id="{C09D6DAA-4DE4-48D5-84BE-F66B86AAFF86}"/>
+                <a16:creationId xmlns:a16="http://schemas.microsoft.com/office/drawing/2014/main" id="{6815C592-5328-43E8-8919-916A966411F7}"/>
               </a:ext>
             </a:extLst>
           </p:cNvPr>
-          <p:cNvSpPr>
-            <a:spLocks noGrp="1"/>
-          </p:cNvSpPr>
-          <p:nvPr>
-            <p:ph idx="1"/>
-          </p:nvPr>
-        </p:nvSpPr>
-        <p:spPr/>
-        <p:txBody>
-          <a:bodyPr/>
+          <p:cNvSpPr txBox="1"/>
+          <p:nvPr/>
+        </p:nvSpPr>
+        <p:spPr>
+          <a:xfrm>
+            <a:off x="13222205" y="7805467"/>
+            <a:ext cx="2638474" cy="1292662"/>
+          </a:xfrm>
+          <a:prstGeom prst="rect">
+            <a:avLst/>
+          </a:prstGeom>
+          <a:noFill/>
+        </p:spPr>
+        <p:txBody>
+          <a:bodyPr wrap="square" rtlCol="0">
+            <a:spAutoFit/>
+          </a:bodyPr>
           <a:lstStyle/>
           <a:p>
+            <a:r>
+              <a:rPr lang="en-US" sz="1300" b="1" dirty="0"/>
+              <a:t>Landing Sites:</a:t>
+            </a:r>
+          </a:p>
+          <a:p>
+            <a:r>
+              <a:rPr lang="en-US" sz="1300" dirty="0"/>
+              <a:t>1) Stickney Crafter (1</a:t>
+            </a:r>
+            <a:r>
+              <a:rPr lang="en-US" sz="1300" baseline="30000" dirty="0"/>
+              <a:t>o </a:t>
+            </a:r>
+            <a:r>
+              <a:rPr lang="en-US" sz="1300" dirty="0"/>
+              <a:t>N 49</a:t>
+            </a:r>
+            <a:r>
+              <a:rPr lang="en-US" sz="1300" baseline="30000" dirty="0"/>
+              <a:t>o </a:t>
+            </a:r>
+            <a:r>
+              <a:rPr lang="en-US" sz="1300" dirty="0"/>
+              <a:t>W)</a:t>
+            </a:r>
+          </a:p>
+          <a:p>
+            <a:r>
+              <a:rPr lang="en-US" sz="1300" dirty="0"/>
+              <a:t>2) </a:t>
+            </a:r>
+            <a:r>
+              <a:rPr lang="en-US" sz="1300" dirty="0" err="1"/>
+              <a:t>Clustril</a:t>
+            </a:r>
+            <a:r>
+              <a:rPr lang="en-US" sz="1300" dirty="0"/>
+              <a:t> Crater (60</a:t>
+            </a:r>
+            <a:r>
+              <a:rPr lang="en-US" sz="1300" baseline="30000" dirty="0"/>
+              <a:t>o </a:t>
+            </a:r>
+            <a:r>
+              <a:rPr lang="en-US" sz="1300" dirty="0"/>
+              <a:t>N 91</a:t>
+            </a:r>
+            <a:r>
+              <a:rPr lang="en-US" sz="1300" baseline="30000" dirty="0"/>
+              <a:t>o </a:t>
+            </a:r>
+            <a:r>
+              <a:rPr lang="en-US" sz="1300" dirty="0"/>
+              <a:t>W)</a:t>
+            </a:r>
+          </a:p>
+          <a:p>
+            <a:r>
+              <a:rPr lang="en-US" sz="1300" dirty="0"/>
+              <a:t>3) </a:t>
+            </a:r>
+            <a:r>
+              <a:rPr lang="en-US" sz="1300" dirty="0" err="1"/>
+              <a:t>Flimnap</a:t>
+            </a:r>
+            <a:r>
+              <a:rPr lang="en-US" sz="1300" dirty="0"/>
+              <a:t> Crater (60</a:t>
+            </a:r>
+            <a:r>
+              <a:rPr lang="en-US" sz="1300" baseline="30000" dirty="0"/>
+              <a:t>o </a:t>
+            </a:r>
+            <a:r>
+              <a:rPr lang="en-US" sz="1300" dirty="0"/>
+              <a:t>N 10</a:t>
+            </a:r>
+            <a:r>
+              <a:rPr lang="en-US" sz="1300" baseline="30000" dirty="0"/>
+              <a:t>o </a:t>
+            </a:r>
+            <a:r>
+              <a:rPr lang="en-US" sz="1300" dirty="0"/>
+              <a:t>E)</a:t>
+            </a:r>
+          </a:p>
+          <a:p>
+            <a:r>
+              <a:rPr lang="en-US" sz="1300" dirty="0"/>
+              <a:t>4) Gulliver Crater (81</a:t>
+            </a:r>
+            <a:r>
+              <a:rPr lang="en-US" sz="1300" baseline="30000" dirty="0"/>
+              <a:t>o </a:t>
+            </a:r>
+            <a:r>
+              <a:rPr lang="en-US" sz="1300" dirty="0"/>
+              <a:t>N 165</a:t>
+            </a:r>
+            <a:r>
+              <a:rPr lang="en-US" sz="1300" baseline="30000" dirty="0"/>
+              <a:t>o </a:t>
+            </a:r>
+            <a:r>
+              <a:rPr lang="en-US" sz="1300" dirty="0"/>
+              <a:t>E)</a:t>
+            </a:r>
+          </a:p>
+          <a:p>
+            <a:endParaRPr lang="en-US" sz="1300" dirty="0"/>
+          </a:p>
+        </p:txBody>
+      </p:sp>
+      <p:sp>
+        <p:nvSpPr>
+          <p:cNvPr id="18" name="Arc 17">
+            <a:extLst>
+              <a:ext uri="{FF2B5EF4-FFF2-40B4-BE49-F238E27FC236}">
+                <a16:creationId xmlns:a16="http://schemas.microsoft.com/office/drawing/2014/main" id="{F5D3FB17-C281-4FBB-855B-692517CAA32A}"/>
+              </a:ext>
+            </a:extLst>
+          </p:cNvPr>
+          <p:cNvSpPr/>
+          <p:nvPr/>
+        </p:nvSpPr>
+        <p:spPr>
+          <a:xfrm flipH="1" flipV="1">
+            <a:off x="8541486" y="4049433"/>
+            <a:ext cx="6363233" cy="3047888"/>
+          </a:xfrm>
+          <a:prstGeom prst="arc">
+            <a:avLst>
+              <a:gd name="adj1" fmla="val 16723215"/>
+              <a:gd name="adj2" fmla="val 0"/>
+            </a:avLst>
+          </a:prstGeom>
+          <a:ln w="25400">
+            <a:solidFill>
+              <a:schemeClr val="accent1">
+                <a:lumMod val="50000"/>
+              </a:schemeClr>
+            </a:solidFill>
+            <a:headEnd type="arrow"/>
+          </a:ln>
+        </p:spPr>
+        <p:style>
+          <a:lnRef idx="1">
+            <a:schemeClr val="accent1"/>
+          </a:lnRef>
+          <a:fillRef idx="0">
+            <a:schemeClr val="accent1"/>
+          </a:fillRef>
+          <a:effectRef idx="0">
+            <a:schemeClr val="accent1"/>
+          </a:effectRef>
+          <a:fontRef idx="minor">
+            <a:schemeClr val="tx1"/>
+          </a:fontRef>
+        </p:style>
+        <p:txBody>
+          <a:bodyPr rtlCol="0" anchor="ctr"/>
+          <a:lstStyle/>
+          <a:p>
+            <a:pPr algn="ctr"/>
             <a:endParaRPr lang="en-US" dirty="0"/>
+          </a:p>
+        </p:txBody>
+      </p:sp>
+      <p:sp>
+        <p:nvSpPr>
+          <p:cNvPr id="25" name="Flowchart: Connector 24">
+            <a:extLst>
+              <a:ext uri="{FF2B5EF4-FFF2-40B4-BE49-F238E27FC236}">
+                <a16:creationId xmlns:a16="http://schemas.microsoft.com/office/drawing/2014/main" id="{A37F6161-1FE8-4A05-A5B4-F3AC8D02A0A4}"/>
+              </a:ext>
+            </a:extLst>
+          </p:cNvPr>
+          <p:cNvSpPr/>
+          <p:nvPr/>
+        </p:nvSpPr>
+        <p:spPr>
+          <a:xfrm>
+            <a:off x="9577489" y="6453075"/>
+            <a:ext cx="805433" cy="780901"/>
+          </a:xfrm>
+          <a:prstGeom prst="flowChartConnector">
+            <a:avLst/>
+          </a:prstGeom>
+          <a:solidFill>
+            <a:schemeClr val="bg2"/>
+          </a:solidFill>
+          <a:ln>
+            <a:solidFill>
+              <a:schemeClr val="tx1"/>
+            </a:solidFill>
+          </a:ln>
+        </p:spPr>
+        <p:style>
+          <a:lnRef idx="2">
+            <a:schemeClr val="accent1">
+              <a:shade val="50000"/>
+            </a:schemeClr>
+          </a:lnRef>
+          <a:fillRef idx="1">
+            <a:schemeClr val="accent1"/>
+          </a:fillRef>
+          <a:effectRef idx="0">
+            <a:schemeClr val="accent1"/>
+          </a:effectRef>
+          <a:fontRef idx="minor">
+            <a:schemeClr val="lt1"/>
+          </a:fontRef>
+        </p:style>
+        <p:txBody>
+          <a:bodyPr rtlCol="0" anchor="ctr"/>
+          <a:lstStyle/>
+          <a:p>
+            <a:pPr algn="ctr"/>
+            <a:r>
+              <a:rPr lang="en-US" sz="3200" dirty="0">
+                <a:solidFill>
+                  <a:schemeClr val="tx1"/>
+                </a:solidFill>
+                <a:latin typeface="Arial Rounded MT Bold" panose="020F0704030504030204" pitchFamily="34" charset="0"/>
+              </a:rPr>
+              <a:t>1</a:t>
+            </a:r>
           </a:p>
         </p:txBody>
       </p:sp>

</xml_diff>